<commit_message>
Added some slides to the Modules presentation.
</commit_message>
<xml_diff>
--- a/Presentations/Modules.pptx
+++ b/Presentations/Modules.pptx
@@ -15,6 +15,14 @@
     <p:sldId id="263" r:id="rId9"/>
     <p:sldId id="264" r:id="rId10"/>
     <p:sldId id="265" r:id="rId11"/>
+    <p:sldId id="266" r:id="rId12"/>
+    <p:sldId id="267" r:id="rId13"/>
+    <p:sldId id="268" r:id="rId14"/>
+    <p:sldId id="273" r:id="rId15"/>
+    <p:sldId id="269" r:id="rId16"/>
+    <p:sldId id="270" r:id="rId17"/>
+    <p:sldId id="271" r:id="rId18"/>
+    <p:sldId id="272" r:id="rId19"/>
   </p:sldIdLst>
   <p:sldSz cx="12192000" cy="6858000"/>
   <p:notesSz cx="6858000" cy="9144000"/>
@@ -113,6 +121,11 @@
       </a:defRPr>
     </a:lvl9pPr>
   </p:defaultTextStyle>
+  <p:extLst>
+    <p:ext uri="{EFAFB233-063F-42B5-8137-9DF3F51BA10A}">
+      <p15:sldGuideLst xmlns:p15="http://schemas.microsoft.com/office/powerpoint/2012/main"/>
+    </p:ext>
+  </p:extLst>
 </p:presentation>
 </file>
 
@@ -263,7 +276,7 @@
           <a:p>
             <a:fld id="{14B552C3-FA97-F042-B62C-712DBB9FA0F1}" type="datetimeFigureOut">
               <a:rPr lang="en-US" smtClean="0"/>
-              <a:t>7/3/23</a:t>
+              <a:t>11/15/23</a:t>
             </a:fld>
             <a:endParaRPr lang="en-US"/>
           </a:p>
@@ -461,7 +474,7 @@
           <a:p>
             <a:fld id="{14B552C3-FA97-F042-B62C-712DBB9FA0F1}" type="datetimeFigureOut">
               <a:rPr lang="en-US" smtClean="0"/>
-              <a:t>7/3/23</a:t>
+              <a:t>11/15/23</a:t>
             </a:fld>
             <a:endParaRPr lang="en-US"/>
           </a:p>
@@ -669,7 +682,7 @@
           <a:p>
             <a:fld id="{14B552C3-FA97-F042-B62C-712DBB9FA0F1}" type="datetimeFigureOut">
               <a:rPr lang="en-US" smtClean="0"/>
-              <a:t>7/3/23</a:t>
+              <a:t>11/15/23</a:t>
             </a:fld>
             <a:endParaRPr lang="en-US"/>
           </a:p>
@@ -867,7 +880,7 @@
           <a:p>
             <a:fld id="{14B552C3-FA97-F042-B62C-712DBB9FA0F1}" type="datetimeFigureOut">
               <a:rPr lang="en-US" smtClean="0"/>
-              <a:t>7/3/23</a:t>
+              <a:t>11/15/23</a:t>
             </a:fld>
             <a:endParaRPr lang="en-US"/>
           </a:p>
@@ -1142,7 +1155,7 @@
           <a:p>
             <a:fld id="{14B552C3-FA97-F042-B62C-712DBB9FA0F1}" type="datetimeFigureOut">
               <a:rPr lang="en-US" smtClean="0"/>
-              <a:t>7/3/23</a:t>
+              <a:t>11/15/23</a:t>
             </a:fld>
             <a:endParaRPr lang="en-US"/>
           </a:p>
@@ -1407,7 +1420,7 @@
           <a:p>
             <a:fld id="{14B552C3-FA97-F042-B62C-712DBB9FA0F1}" type="datetimeFigureOut">
               <a:rPr lang="en-US" smtClean="0"/>
-              <a:t>7/3/23</a:t>
+              <a:t>11/15/23</a:t>
             </a:fld>
             <a:endParaRPr lang="en-US"/>
           </a:p>
@@ -1819,7 +1832,7 @@
           <a:p>
             <a:fld id="{14B552C3-FA97-F042-B62C-712DBB9FA0F1}" type="datetimeFigureOut">
               <a:rPr lang="en-US" smtClean="0"/>
-              <a:t>7/3/23</a:t>
+              <a:t>11/15/23</a:t>
             </a:fld>
             <a:endParaRPr lang="en-US"/>
           </a:p>
@@ -1960,7 +1973,7 @@
           <a:p>
             <a:fld id="{14B552C3-FA97-F042-B62C-712DBB9FA0F1}" type="datetimeFigureOut">
               <a:rPr lang="en-US" smtClean="0"/>
-              <a:t>7/3/23</a:t>
+              <a:t>11/15/23</a:t>
             </a:fld>
             <a:endParaRPr lang="en-US"/>
           </a:p>
@@ -2073,7 +2086,7 @@
           <a:p>
             <a:fld id="{14B552C3-FA97-F042-B62C-712DBB9FA0F1}" type="datetimeFigureOut">
               <a:rPr lang="en-US" smtClean="0"/>
-              <a:t>7/3/23</a:t>
+              <a:t>11/15/23</a:t>
             </a:fld>
             <a:endParaRPr lang="en-US"/>
           </a:p>
@@ -2384,7 +2397,7 @@
           <a:p>
             <a:fld id="{14B552C3-FA97-F042-B62C-712DBB9FA0F1}" type="datetimeFigureOut">
               <a:rPr lang="en-US" smtClean="0"/>
-              <a:t>7/3/23</a:t>
+              <a:t>11/15/23</a:t>
             </a:fld>
             <a:endParaRPr lang="en-US"/>
           </a:p>
@@ -2672,7 +2685,7 @@
           <a:p>
             <a:fld id="{14B552C3-FA97-F042-B62C-712DBB9FA0F1}" type="datetimeFigureOut">
               <a:rPr lang="en-US" smtClean="0"/>
-              <a:t>7/3/23</a:t>
+              <a:t>11/15/23</a:t>
             </a:fld>
             <a:endParaRPr lang="en-US"/>
           </a:p>
@@ -2913,7 +2926,7 @@
           <a:p>
             <a:fld id="{14B552C3-FA97-F042-B62C-712DBB9FA0F1}" type="datetimeFigureOut">
               <a:rPr lang="en-US" smtClean="0"/>
-              <a:t>7/3/23</a:t>
+              <a:t>11/15/23</a:t>
             </a:fld>
             <a:endParaRPr lang="en-US"/>
           </a:p>
@@ -3353,7 +3366,7 @@
           <a:p>
             <a:r>
               <a:rPr lang="en-US" dirty="0"/>
-              <a:t>C++ 2020 Modules</a:t>
+              <a:t>C++ Modules</a:t>
             </a:r>
           </a:p>
         </p:txBody>
@@ -3376,8 +3389,16 @@
         </p:nvSpPr>
         <p:spPr/>
         <p:txBody>
-          <a:bodyPr/>
-          <a:lstStyle/>
+          <a:bodyPr>
+            <a:normAutofit/>
+          </a:bodyPr>
+          <a:lstStyle/>
+          <a:p>
+            <a:r>
+              <a:rPr lang="en-US" dirty="0"/>
+              <a:t>Peter Chapin</a:t>
+            </a:r>
+          </a:p>
           <a:p>
             <a:r>
               <a:rPr lang="en-US" dirty="0"/>
@@ -3388,12 +3409,6 @@
             <a:r>
               <a:rPr lang="en-US" dirty="0"/>
               <a:t>Vermont State University</a:t>
-            </a:r>
-          </a:p>
-          <a:p>
-            <a:r>
-              <a:rPr lang="en-US" dirty="0"/>
-              <a:t>Peter Chapin</a:t>
             </a:r>
           </a:p>
         </p:txBody>
@@ -3479,7 +3494,15 @@
           <a:p>
             <a:r>
               <a:rPr lang="en-US" dirty="0"/>
-              <a:t>Classes, inline functions, and templates all must be defined in header files, meaning that there is one definition in every TU that uses them. </a:t>
+              <a:t>Classes, inline functions, and templates all must be </a:t>
+            </a:r>
+            <a:r>
+              <a:rPr lang="en-US" i="1" dirty="0"/>
+              <a:t>defined</a:t>
+            </a:r>
+            <a:r>
+              <a:rPr lang="en-US" dirty="0"/>
+              <a:t> in header files, meaning that there is one definition in every TU that uses them. </a:t>
             </a:r>
             <a:r>
               <a:rPr lang="en-US" i="1" dirty="0"/>
@@ -3501,7 +3524,7 @@
             <a:pPr lvl="1"/>
             <a:r>
               <a:rPr lang="en-US" dirty="0"/>
-              <a:t>So the description of the ODR in the standard is very long and twisted to allow for this reality.</a:t>
+              <a:t>The description of the ODR in the standard is very long and complicated to allow for this reality.</a:t>
             </a:r>
           </a:p>
           <a:p>
@@ -3531,6 +3554,1959 @@
     <p:extLst>
       <p:ext uri="{BB962C8B-B14F-4D97-AF65-F5344CB8AC3E}">
         <p14:creationId xmlns:p14="http://schemas.microsoft.com/office/powerpoint/2010/main" val="2595261954"/>
+      </p:ext>
+    </p:extLst>
+  </p:cSld>
+  <p:clrMapOvr>
+    <a:masterClrMapping/>
+  </p:clrMapOvr>
+</p:sld>
+</file>
+
+<file path=ppt/slides/slide11.xml><?xml version="1.0" encoding="utf-8"?>
+<p:sld xmlns:a="http://schemas.openxmlformats.org/drawingml/2006/main" xmlns:r="http://schemas.openxmlformats.org/officeDocument/2006/relationships" xmlns:p="http://schemas.openxmlformats.org/presentationml/2006/main">
+  <p:cSld>
+    <p:spTree>
+      <p:nvGrpSpPr>
+        <p:cNvPr id="1" name=""/>
+        <p:cNvGrpSpPr/>
+        <p:nvPr/>
+      </p:nvGrpSpPr>
+      <p:grpSpPr>
+        <a:xfrm>
+          <a:off x="0" y="0"/>
+          <a:ext cx="0" cy="0"/>
+          <a:chOff x="0" y="0"/>
+          <a:chExt cx="0" cy="0"/>
+        </a:xfrm>
+      </p:grpSpPr>
+      <p:sp>
+        <p:nvSpPr>
+          <p:cNvPr id="2" name="Title 1">
+            <a:extLst>
+              <a:ext uri="{FF2B5EF4-FFF2-40B4-BE49-F238E27FC236}">
+                <a16:creationId xmlns:a16="http://schemas.microsoft.com/office/drawing/2014/main" id="{FB97D8E6-D3B3-C264-B6AC-B58B843BC725}"/>
+              </a:ext>
+            </a:extLst>
+          </p:cNvPr>
+          <p:cNvSpPr>
+            <a:spLocks noGrp="1"/>
+          </p:cNvSpPr>
+          <p:nvPr>
+            <p:ph type="title"/>
+          </p:nvPr>
+        </p:nvSpPr>
+        <p:spPr/>
+        <p:txBody>
+          <a:bodyPr/>
+          <a:lstStyle/>
+          <a:p>
+            <a:r>
+              <a:rPr lang="en-US" dirty="0"/>
+              <a:t>Preprocessor Macros!</a:t>
+            </a:r>
+          </a:p>
+        </p:txBody>
+      </p:sp>
+      <p:sp>
+        <p:nvSpPr>
+          <p:cNvPr id="13" name="Content Placeholder 12">
+            <a:extLst>
+              <a:ext uri="{FF2B5EF4-FFF2-40B4-BE49-F238E27FC236}">
+                <a16:creationId xmlns:a16="http://schemas.microsoft.com/office/drawing/2014/main" id="{F888A051-44D3-B749-3CCD-2ACE1AD0651F}"/>
+              </a:ext>
+            </a:extLst>
+          </p:cNvPr>
+          <p:cNvSpPr>
+            <a:spLocks noGrp="1"/>
+          </p:cNvSpPr>
+          <p:nvPr>
+            <p:ph idx="1"/>
+          </p:nvPr>
+        </p:nvSpPr>
+        <p:spPr>
+          <a:xfrm>
+            <a:off x="838200" y="4652144"/>
+            <a:ext cx="10515600" cy="1704873"/>
+          </a:xfrm>
+        </p:spPr>
+        <p:txBody>
+          <a:bodyPr/>
+          <a:lstStyle/>
+          <a:p>
+            <a:r>
+              <a:rPr lang="en-US" dirty="0"/>
+              <a:t>The macro </a:t>
+            </a:r>
+            <a:r>
+              <a:rPr lang="en-US" dirty="0">
+                <a:latin typeface="Consolas" panose="020B0609020204030204" pitchFamily="49" charset="0"/>
+                <a:cs typeface="Consolas" panose="020B0609020204030204" pitchFamily="49" charset="0"/>
+              </a:rPr>
+              <a:t>jibber</a:t>
+            </a:r>
+            <a:r>
+              <a:rPr lang="en-US" dirty="0"/>
+              <a:t> bleeds into the other header and changes it…</a:t>
+            </a:r>
+          </a:p>
+          <a:p>
+            <a:r>
+              <a:rPr lang="en-US" dirty="0"/>
+              <a:t>… even if the two headers are written by completely different people!</a:t>
+            </a:r>
+          </a:p>
+        </p:txBody>
+      </p:sp>
+      <p:sp>
+        <p:nvSpPr>
+          <p:cNvPr id="3" name="TextBox 2">
+            <a:extLst>
+              <a:ext uri="{FF2B5EF4-FFF2-40B4-BE49-F238E27FC236}">
+                <a16:creationId xmlns:a16="http://schemas.microsoft.com/office/drawing/2014/main" id="{38A87633-7827-D45A-3CF1-AF52EB2371D5}"/>
+              </a:ext>
+            </a:extLst>
+          </p:cNvPr>
+          <p:cNvSpPr txBox="1"/>
+          <p:nvPr/>
+        </p:nvSpPr>
+        <p:spPr>
+          <a:xfrm>
+            <a:off x="7029330" y="1243208"/>
+            <a:ext cx="2844048" cy="923330"/>
+          </a:xfrm>
+          <a:prstGeom prst="rect">
+            <a:avLst/>
+          </a:prstGeom>
+          <a:noFill/>
+          <a:ln>
+            <a:solidFill>
+              <a:schemeClr val="accent1"/>
+            </a:solidFill>
+          </a:ln>
+        </p:spPr>
+        <p:txBody>
+          <a:bodyPr wrap="none" rtlCol="0">
+            <a:spAutoFit/>
+          </a:bodyPr>
+          <a:lstStyle/>
+          <a:p>
+            <a:r>
+              <a:rPr lang="en-US" dirty="0">
+                <a:latin typeface="Consolas" panose="020B0609020204030204" pitchFamily="49" charset="0"/>
+                <a:cs typeface="Consolas" panose="020B0609020204030204" pitchFamily="49" charset="0"/>
+              </a:rPr>
+              <a:t>// Header1.hpp</a:t>
+            </a:r>
+          </a:p>
+          <a:p>
+            <a:endParaRPr lang="en-US" dirty="0">
+              <a:latin typeface="Consolas" panose="020B0609020204030204" pitchFamily="49" charset="0"/>
+              <a:cs typeface="Consolas" panose="020B0609020204030204" pitchFamily="49" charset="0"/>
+            </a:endParaRPr>
+          </a:p>
+          <a:p>
+            <a:r>
+              <a:rPr lang="en-US" dirty="0">
+                <a:latin typeface="Consolas" panose="020B0609020204030204" pitchFamily="49" charset="0"/>
+                <a:cs typeface="Consolas" panose="020B0609020204030204" pitchFamily="49" charset="0"/>
+              </a:rPr>
+              <a:t>#define jibber jabber</a:t>
+            </a:r>
+          </a:p>
+        </p:txBody>
+      </p:sp>
+      <p:sp>
+        <p:nvSpPr>
+          <p:cNvPr id="4" name="TextBox 3">
+            <a:extLst>
+              <a:ext uri="{FF2B5EF4-FFF2-40B4-BE49-F238E27FC236}">
+                <a16:creationId xmlns:a16="http://schemas.microsoft.com/office/drawing/2014/main" id="{1AEFC339-291B-4BB2-6A0A-093C8B2CE56A}"/>
+              </a:ext>
+            </a:extLst>
+          </p:cNvPr>
+          <p:cNvSpPr txBox="1"/>
+          <p:nvPr/>
+        </p:nvSpPr>
+        <p:spPr>
+          <a:xfrm>
+            <a:off x="7029331" y="3353746"/>
+            <a:ext cx="2844047" cy="923330"/>
+          </a:xfrm>
+          <a:prstGeom prst="rect">
+            <a:avLst/>
+          </a:prstGeom>
+          <a:noFill/>
+          <a:ln>
+            <a:solidFill>
+              <a:schemeClr val="accent1"/>
+            </a:solidFill>
+          </a:ln>
+        </p:spPr>
+        <p:txBody>
+          <a:bodyPr wrap="square" rtlCol="0">
+            <a:spAutoFit/>
+          </a:bodyPr>
+          <a:lstStyle/>
+          <a:p>
+            <a:r>
+              <a:rPr lang="en-US" dirty="0">
+                <a:latin typeface="Consolas" panose="020B0609020204030204" pitchFamily="49" charset="0"/>
+                <a:cs typeface="Consolas" panose="020B0609020204030204" pitchFamily="49" charset="0"/>
+              </a:rPr>
+              <a:t>// Header2.hpp</a:t>
+            </a:r>
+          </a:p>
+          <a:p>
+            <a:endParaRPr lang="en-US" dirty="0">
+              <a:latin typeface="Consolas" panose="020B0609020204030204" pitchFamily="49" charset="0"/>
+              <a:cs typeface="Consolas" panose="020B0609020204030204" pitchFamily="49" charset="0"/>
+            </a:endParaRPr>
+          </a:p>
+          <a:p>
+            <a:r>
+              <a:rPr lang="en-US" b="1" dirty="0">
+                <a:latin typeface="Consolas" panose="020B0609020204030204" pitchFamily="49" charset="0"/>
+                <a:cs typeface="Consolas" panose="020B0609020204030204" pitchFamily="49" charset="0"/>
+              </a:rPr>
+              <a:t>void</a:t>
+            </a:r>
+            <a:r>
+              <a:rPr lang="en-US" dirty="0">
+                <a:latin typeface="Consolas" panose="020B0609020204030204" pitchFamily="49" charset="0"/>
+                <a:cs typeface="Consolas" panose="020B0609020204030204" pitchFamily="49" charset="0"/>
+              </a:rPr>
+              <a:t> jibber( </a:t>
+            </a:r>
+            <a:r>
+              <a:rPr lang="en-US" b="1" dirty="0">
+                <a:latin typeface="Consolas" panose="020B0609020204030204" pitchFamily="49" charset="0"/>
+                <a:cs typeface="Consolas" panose="020B0609020204030204" pitchFamily="49" charset="0"/>
+              </a:rPr>
+              <a:t>int</a:t>
+            </a:r>
+            <a:r>
+              <a:rPr lang="en-US" dirty="0">
+                <a:latin typeface="Consolas" panose="020B0609020204030204" pitchFamily="49" charset="0"/>
+                <a:cs typeface="Consolas" panose="020B0609020204030204" pitchFamily="49" charset="0"/>
+              </a:rPr>
+              <a:t> x );</a:t>
+            </a:r>
+          </a:p>
+        </p:txBody>
+      </p:sp>
+      <p:sp>
+        <p:nvSpPr>
+          <p:cNvPr id="5" name="TextBox 4">
+            <a:extLst>
+              <a:ext uri="{FF2B5EF4-FFF2-40B4-BE49-F238E27FC236}">
+                <a16:creationId xmlns:a16="http://schemas.microsoft.com/office/drawing/2014/main" id="{68F93554-5766-AC20-80C4-93E101ADFD35}"/>
+              </a:ext>
+            </a:extLst>
+          </p:cNvPr>
+          <p:cNvSpPr txBox="1"/>
+          <p:nvPr/>
+        </p:nvSpPr>
+        <p:spPr>
+          <a:xfrm>
+            <a:off x="2133600" y="2117477"/>
+            <a:ext cx="2970685" cy="1200329"/>
+          </a:xfrm>
+          <a:prstGeom prst="rect">
+            <a:avLst/>
+          </a:prstGeom>
+          <a:noFill/>
+          <a:ln>
+            <a:solidFill>
+              <a:schemeClr val="accent1"/>
+            </a:solidFill>
+          </a:ln>
+        </p:spPr>
+        <p:txBody>
+          <a:bodyPr wrap="none" rtlCol="0">
+            <a:spAutoFit/>
+          </a:bodyPr>
+          <a:lstStyle/>
+          <a:p>
+            <a:r>
+              <a:rPr lang="en-US" dirty="0">
+                <a:latin typeface="Consolas" panose="020B0609020204030204" pitchFamily="49" charset="0"/>
+                <a:cs typeface="Consolas" panose="020B0609020204030204" pitchFamily="49" charset="0"/>
+              </a:rPr>
+              <a:t>// </a:t>
+            </a:r>
+            <a:r>
+              <a:rPr lang="en-US" dirty="0" err="1">
+                <a:latin typeface="Consolas" panose="020B0609020204030204" pitchFamily="49" charset="0"/>
+                <a:cs typeface="Consolas" panose="020B0609020204030204" pitchFamily="49" charset="0"/>
+              </a:rPr>
+              <a:t>MyProg.cpp</a:t>
+            </a:r>
+            <a:endParaRPr lang="en-US" dirty="0">
+              <a:latin typeface="Consolas" panose="020B0609020204030204" pitchFamily="49" charset="0"/>
+              <a:cs typeface="Consolas" panose="020B0609020204030204" pitchFamily="49" charset="0"/>
+            </a:endParaRPr>
+          </a:p>
+          <a:p>
+            <a:endParaRPr lang="en-US" dirty="0">
+              <a:latin typeface="Consolas" panose="020B0609020204030204" pitchFamily="49" charset="0"/>
+              <a:cs typeface="Consolas" panose="020B0609020204030204" pitchFamily="49" charset="0"/>
+            </a:endParaRPr>
+          </a:p>
+          <a:p>
+            <a:r>
+              <a:rPr lang="en-US" dirty="0">
+                <a:latin typeface="Consolas" panose="020B0609020204030204" pitchFamily="49" charset="0"/>
+                <a:cs typeface="Consolas" panose="020B0609020204030204" pitchFamily="49" charset="0"/>
+              </a:rPr>
+              <a:t>#include “Header1.hpp”</a:t>
+            </a:r>
+          </a:p>
+          <a:p>
+            <a:r>
+              <a:rPr lang="en-US" dirty="0">
+                <a:latin typeface="Consolas" panose="020B0609020204030204" pitchFamily="49" charset="0"/>
+                <a:cs typeface="Consolas" panose="020B0609020204030204" pitchFamily="49" charset="0"/>
+              </a:rPr>
+              <a:t>#include “Header2.hpp”</a:t>
+            </a:r>
+          </a:p>
+        </p:txBody>
+      </p:sp>
+      <p:cxnSp>
+        <p:nvCxnSpPr>
+          <p:cNvPr id="7" name="Straight Arrow Connector 6">
+            <a:extLst>
+              <a:ext uri="{FF2B5EF4-FFF2-40B4-BE49-F238E27FC236}">
+                <a16:creationId xmlns:a16="http://schemas.microsoft.com/office/drawing/2014/main" id="{CC15BD4B-156F-B011-8675-422F92A0CC9C}"/>
+              </a:ext>
+            </a:extLst>
+          </p:cNvPr>
+          <p:cNvCxnSpPr>
+            <a:stCxn id="5" idx="3"/>
+            <a:endCxn id="3" idx="1"/>
+          </p:cNvCxnSpPr>
+          <p:nvPr/>
+        </p:nvCxnSpPr>
+        <p:spPr>
+          <a:xfrm flipV="1">
+            <a:off x="5104285" y="1704873"/>
+            <a:ext cx="1925045" cy="1012769"/>
+          </a:xfrm>
+          <a:prstGeom prst="straightConnector1">
+            <a:avLst/>
+          </a:prstGeom>
+          <a:ln>
+            <a:tailEnd type="triangle"/>
+          </a:ln>
+        </p:spPr>
+        <p:style>
+          <a:lnRef idx="1">
+            <a:schemeClr val="accent1"/>
+          </a:lnRef>
+          <a:fillRef idx="0">
+            <a:schemeClr val="accent1"/>
+          </a:fillRef>
+          <a:effectRef idx="0">
+            <a:schemeClr val="accent1"/>
+          </a:effectRef>
+          <a:fontRef idx="minor">
+            <a:schemeClr val="tx1"/>
+          </a:fontRef>
+        </p:style>
+      </p:cxnSp>
+      <p:cxnSp>
+        <p:nvCxnSpPr>
+          <p:cNvPr id="9" name="Straight Arrow Connector 8">
+            <a:extLst>
+              <a:ext uri="{FF2B5EF4-FFF2-40B4-BE49-F238E27FC236}">
+                <a16:creationId xmlns:a16="http://schemas.microsoft.com/office/drawing/2014/main" id="{8C07CF4E-41B3-218D-C632-520C75A5CE20}"/>
+              </a:ext>
+            </a:extLst>
+          </p:cNvPr>
+          <p:cNvCxnSpPr>
+            <a:cxnSpLocks/>
+            <a:stCxn id="5" idx="3"/>
+            <a:endCxn id="4" idx="1"/>
+          </p:cNvCxnSpPr>
+          <p:nvPr/>
+        </p:nvCxnSpPr>
+        <p:spPr>
+          <a:xfrm>
+            <a:off x="5104285" y="2717642"/>
+            <a:ext cx="1925046" cy="1097769"/>
+          </a:xfrm>
+          <a:prstGeom prst="straightConnector1">
+            <a:avLst/>
+          </a:prstGeom>
+          <a:ln>
+            <a:tailEnd type="triangle"/>
+          </a:ln>
+        </p:spPr>
+        <p:style>
+          <a:lnRef idx="1">
+            <a:schemeClr val="accent1"/>
+          </a:lnRef>
+          <a:fillRef idx="0">
+            <a:schemeClr val="accent1"/>
+          </a:fillRef>
+          <a:effectRef idx="0">
+            <a:schemeClr val="accent1"/>
+          </a:effectRef>
+          <a:fontRef idx="minor">
+            <a:schemeClr val="tx1"/>
+          </a:fontRef>
+        </p:style>
+      </p:cxnSp>
+      <p:sp>
+        <p:nvSpPr>
+          <p:cNvPr id="10" name="Oval 9">
+            <a:extLst>
+              <a:ext uri="{FF2B5EF4-FFF2-40B4-BE49-F238E27FC236}">
+                <a16:creationId xmlns:a16="http://schemas.microsoft.com/office/drawing/2014/main" id="{75E141D6-175B-B38B-25A3-ABC6298DA954}"/>
+              </a:ext>
+            </a:extLst>
+          </p:cNvPr>
+          <p:cNvSpPr/>
+          <p:nvPr/>
+        </p:nvSpPr>
+        <p:spPr>
+          <a:xfrm>
+            <a:off x="8872029" y="1801468"/>
+            <a:ext cx="1001349" cy="383810"/>
+          </a:xfrm>
+          <a:prstGeom prst="ellipse">
+            <a:avLst/>
+          </a:prstGeom>
+          <a:noFill/>
+        </p:spPr>
+        <p:style>
+          <a:lnRef idx="2">
+            <a:schemeClr val="accent1">
+              <a:shade val="15000"/>
+            </a:schemeClr>
+          </a:lnRef>
+          <a:fillRef idx="1">
+            <a:schemeClr val="accent1"/>
+          </a:fillRef>
+          <a:effectRef idx="0">
+            <a:schemeClr val="accent1"/>
+          </a:effectRef>
+          <a:fontRef idx="minor">
+            <a:schemeClr val="lt1"/>
+          </a:fontRef>
+        </p:style>
+        <p:txBody>
+          <a:bodyPr rtlCol="0" anchor="ctr"/>
+          <a:lstStyle/>
+          <a:p>
+            <a:pPr algn="ctr"/>
+            <a:endParaRPr lang="en-US"/>
+          </a:p>
+        </p:txBody>
+      </p:sp>
+      <p:cxnSp>
+        <p:nvCxnSpPr>
+          <p:cNvPr id="12" name="Straight Arrow Connector 11">
+            <a:extLst>
+              <a:ext uri="{FF2B5EF4-FFF2-40B4-BE49-F238E27FC236}">
+                <a16:creationId xmlns:a16="http://schemas.microsoft.com/office/drawing/2014/main" id="{12EBE170-F226-336A-48BF-A28EC7F6A6FB}"/>
+              </a:ext>
+            </a:extLst>
+          </p:cNvPr>
+          <p:cNvCxnSpPr>
+            <a:cxnSpLocks/>
+            <a:stCxn id="10" idx="4"/>
+          </p:cNvCxnSpPr>
+          <p:nvPr/>
+        </p:nvCxnSpPr>
+        <p:spPr>
+          <a:xfrm flipH="1">
+            <a:off x="8348870" y="2185278"/>
+            <a:ext cx="1023834" cy="1707988"/>
+          </a:xfrm>
+          <a:prstGeom prst="straightConnector1">
+            <a:avLst/>
+          </a:prstGeom>
+          <a:ln>
+            <a:tailEnd type="triangle"/>
+          </a:ln>
+        </p:spPr>
+        <p:style>
+          <a:lnRef idx="1">
+            <a:schemeClr val="accent1"/>
+          </a:lnRef>
+          <a:fillRef idx="0">
+            <a:schemeClr val="accent1"/>
+          </a:fillRef>
+          <a:effectRef idx="0">
+            <a:schemeClr val="accent1"/>
+          </a:effectRef>
+          <a:fontRef idx="minor">
+            <a:schemeClr val="tx1"/>
+          </a:fontRef>
+        </p:style>
+      </p:cxnSp>
+    </p:spTree>
+    <p:extLst>
+      <p:ext uri="{BB962C8B-B14F-4D97-AF65-F5344CB8AC3E}">
+        <p14:creationId xmlns:p14="http://schemas.microsoft.com/office/powerpoint/2010/main" val="3444890869"/>
+      </p:ext>
+    </p:extLst>
+  </p:cSld>
+  <p:clrMapOvr>
+    <a:masterClrMapping/>
+  </p:clrMapOvr>
+</p:sld>
+</file>
+
+<file path=ppt/slides/slide12.xml><?xml version="1.0" encoding="utf-8"?>
+<p:sld xmlns:a="http://schemas.openxmlformats.org/drawingml/2006/main" xmlns:r="http://schemas.openxmlformats.org/officeDocument/2006/relationships" xmlns:p="http://schemas.openxmlformats.org/presentationml/2006/main">
+  <p:cSld>
+    <p:spTree>
+      <p:nvGrpSpPr>
+        <p:cNvPr id="1" name=""/>
+        <p:cNvGrpSpPr/>
+        <p:nvPr/>
+      </p:nvGrpSpPr>
+      <p:grpSpPr>
+        <a:xfrm>
+          <a:off x="0" y="0"/>
+          <a:ext cx="0" cy="0"/>
+          <a:chOff x="0" y="0"/>
+          <a:chExt cx="0" cy="0"/>
+        </a:xfrm>
+      </p:grpSpPr>
+      <p:sp>
+        <p:nvSpPr>
+          <p:cNvPr id="2" name="Title 1">
+            <a:extLst>
+              <a:ext uri="{FF2B5EF4-FFF2-40B4-BE49-F238E27FC236}">
+                <a16:creationId xmlns:a16="http://schemas.microsoft.com/office/drawing/2014/main" id="{BDC9D471-BFED-A4C5-D721-7553E39E35EA}"/>
+              </a:ext>
+            </a:extLst>
+          </p:cNvPr>
+          <p:cNvSpPr>
+            <a:spLocks noGrp="1"/>
+          </p:cNvSpPr>
+          <p:nvPr>
+            <p:ph type="title"/>
+          </p:nvPr>
+        </p:nvSpPr>
+        <p:spPr/>
+        <p:txBody>
+          <a:bodyPr/>
+          <a:lstStyle/>
+          <a:p>
+            <a:r>
+              <a:rPr lang="en-US" dirty="0"/>
+              <a:t>Contrived?</a:t>
+            </a:r>
+          </a:p>
+        </p:txBody>
+      </p:sp>
+      <p:sp>
+        <p:nvSpPr>
+          <p:cNvPr id="3" name="Content Placeholder 2">
+            <a:extLst>
+              <a:ext uri="{FF2B5EF4-FFF2-40B4-BE49-F238E27FC236}">
+                <a16:creationId xmlns:a16="http://schemas.microsoft.com/office/drawing/2014/main" id="{60536E74-EB70-2E14-85B8-908516119475}"/>
+              </a:ext>
+            </a:extLst>
+          </p:cNvPr>
+          <p:cNvSpPr>
+            <a:spLocks noGrp="1"/>
+          </p:cNvSpPr>
+          <p:nvPr>
+            <p:ph idx="1"/>
+          </p:nvPr>
+        </p:nvSpPr>
+        <p:spPr/>
+        <p:txBody>
+          <a:bodyPr/>
+          <a:lstStyle/>
+          <a:p>
+            <a:r>
+              <a:rPr lang="en-US" dirty="0"/>
+              <a:t>The previous example is contrived, but the problem remains:</a:t>
+            </a:r>
+          </a:p>
+          <a:p>
+            <a:pPr lvl="1"/>
+            <a:r>
+              <a:rPr lang="en-US" dirty="0"/>
+              <a:t>Macros in one header can edit code in other headers in arbitrary ways</a:t>
+            </a:r>
+          </a:p>
+          <a:p>
+            <a:pPr lvl="1"/>
+            <a:r>
+              <a:rPr lang="en-US" i="1" dirty="0"/>
+              <a:t>Macros don’t respect scope</a:t>
+            </a:r>
+            <a:r>
+              <a:rPr lang="en-US" dirty="0"/>
+              <a:t> and don’t know about namespaces!</a:t>
+            </a:r>
+          </a:p>
+          <a:p>
+            <a:r>
+              <a:rPr lang="en-US" dirty="0"/>
+              <a:t>Various “best practices” have evolved to combat this problem</a:t>
+            </a:r>
+          </a:p>
+          <a:p>
+            <a:pPr lvl="1"/>
+            <a:r>
+              <a:rPr lang="en-US" i="1" dirty="0"/>
+              <a:t>Always</a:t>
+            </a:r>
+            <a:r>
+              <a:rPr lang="en-US" dirty="0"/>
+              <a:t> use ALL_</a:t>
+            </a:r>
+            <a:r>
+              <a:rPr lang="en-US" dirty="0">
+                <a:latin typeface="Consolas" panose="020B0609020204030204" pitchFamily="49" charset="0"/>
+                <a:cs typeface="Consolas" panose="020B0609020204030204" pitchFamily="49" charset="0"/>
+              </a:rPr>
+              <a:t>UPPER_CASE</a:t>
+            </a:r>
+            <a:r>
+              <a:rPr lang="en-US" dirty="0"/>
+              <a:t> names for macros</a:t>
+            </a:r>
+          </a:p>
+          <a:p>
+            <a:pPr lvl="1"/>
+            <a:r>
+              <a:rPr lang="en-US" i="1" dirty="0"/>
+              <a:t>Never</a:t>
+            </a:r>
+            <a:r>
+              <a:rPr lang="en-US" dirty="0"/>
+              <a:t> use </a:t>
+            </a:r>
+            <a:r>
+              <a:rPr lang="en-US" dirty="0" err="1">
+                <a:latin typeface="Consolas" panose="020B0609020204030204" pitchFamily="49" charset="0"/>
+                <a:cs typeface="Consolas" panose="020B0609020204030204" pitchFamily="49" charset="0"/>
+              </a:rPr>
+              <a:t>all_upper_case</a:t>
+            </a:r>
+            <a:r>
+              <a:rPr lang="en-US" dirty="0"/>
+              <a:t> names for anything else!</a:t>
+            </a:r>
+          </a:p>
+          <a:p>
+            <a:pPr lvl="1"/>
+            <a:r>
+              <a:rPr lang="en-US" u="sng" dirty="0"/>
+              <a:t>Don’t use macros at all</a:t>
+            </a:r>
+            <a:r>
+              <a:rPr lang="en-US" dirty="0"/>
+              <a:t> if you can possibly avoid them</a:t>
+            </a:r>
+          </a:p>
+          <a:p>
+            <a:r>
+              <a:rPr lang="en-US" dirty="0"/>
+              <a:t>Since templates must be fully defined in header files, they are exposed to this problem much more than non-template code</a:t>
+            </a:r>
+          </a:p>
+        </p:txBody>
+      </p:sp>
+    </p:spTree>
+    <p:extLst>
+      <p:ext uri="{BB962C8B-B14F-4D97-AF65-F5344CB8AC3E}">
+        <p14:creationId xmlns:p14="http://schemas.microsoft.com/office/powerpoint/2010/main" val="3597193558"/>
+      </p:ext>
+    </p:extLst>
+  </p:cSld>
+  <p:clrMapOvr>
+    <a:masterClrMapping/>
+  </p:clrMapOvr>
+</p:sld>
+</file>
+
+<file path=ppt/slides/slide13.xml><?xml version="1.0" encoding="utf-8"?>
+<p:sld xmlns:a="http://schemas.openxmlformats.org/drawingml/2006/main" xmlns:r="http://schemas.openxmlformats.org/officeDocument/2006/relationships" xmlns:p="http://schemas.openxmlformats.org/presentationml/2006/main">
+  <p:cSld>
+    <p:spTree>
+      <p:nvGrpSpPr>
+        <p:cNvPr id="1" name=""/>
+        <p:cNvGrpSpPr/>
+        <p:nvPr/>
+      </p:nvGrpSpPr>
+      <p:grpSpPr>
+        <a:xfrm>
+          <a:off x="0" y="0"/>
+          <a:ext cx="0" cy="0"/>
+          <a:chOff x="0" y="0"/>
+          <a:chExt cx="0" cy="0"/>
+        </a:xfrm>
+      </p:grpSpPr>
+      <p:sp>
+        <p:nvSpPr>
+          <p:cNvPr id="2" name="Title 1">
+            <a:extLst>
+              <a:ext uri="{FF2B5EF4-FFF2-40B4-BE49-F238E27FC236}">
+                <a16:creationId xmlns:a16="http://schemas.microsoft.com/office/drawing/2014/main" id="{4336DEF2-DE7D-4F14-98DF-759FA7582907}"/>
+              </a:ext>
+            </a:extLst>
+          </p:cNvPr>
+          <p:cNvSpPr>
+            <a:spLocks noGrp="1"/>
+          </p:cNvSpPr>
+          <p:nvPr>
+            <p:ph type="title"/>
+          </p:nvPr>
+        </p:nvSpPr>
+        <p:spPr/>
+        <p:txBody>
+          <a:bodyPr/>
+          <a:lstStyle/>
+          <a:p>
+            <a:r>
+              <a:rPr lang="en-US" dirty="0"/>
+              <a:t>The Other Problem with Headers</a:t>
+            </a:r>
+          </a:p>
+        </p:txBody>
+      </p:sp>
+      <p:sp>
+        <p:nvSpPr>
+          <p:cNvPr id="3" name="Content Placeholder 2">
+            <a:extLst>
+              <a:ext uri="{FF2B5EF4-FFF2-40B4-BE49-F238E27FC236}">
+                <a16:creationId xmlns:a16="http://schemas.microsoft.com/office/drawing/2014/main" id="{FDE6E5FF-81F0-E3B6-8D0C-0090FE14BA95}"/>
+              </a:ext>
+            </a:extLst>
+          </p:cNvPr>
+          <p:cNvSpPr>
+            <a:spLocks noGrp="1"/>
+          </p:cNvSpPr>
+          <p:nvPr>
+            <p:ph idx="1"/>
+          </p:nvPr>
+        </p:nvSpPr>
+        <p:spPr>
+          <a:xfrm>
+            <a:off x="838200" y="3075682"/>
+            <a:ext cx="10515600" cy="3101281"/>
+          </a:xfrm>
+        </p:spPr>
+        <p:txBody>
+          <a:bodyPr/>
+          <a:lstStyle/>
+          <a:p>
+            <a:r>
+              <a:rPr lang="en-US" dirty="0"/>
+              <a:t>A huge amount of code is processed by the compiler </a:t>
+            </a:r>
+            <a:r>
+              <a:rPr lang="en-US" i="1" dirty="0"/>
+              <a:t>in every TU!</a:t>
+            </a:r>
+          </a:p>
+          <a:p>
+            <a:pPr lvl="1"/>
+            <a:r>
+              <a:rPr lang="en-US" dirty="0"/>
+              <a:t>The result is slower than necessary compilation times</a:t>
+            </a:r>
+          </a:p>
+          <a:p>
+            <a:r>
+              <a:rPr lang="en-US" dirty="0"/>
+              <a:t>Consider that most of the standard library is made of templates</a:t>
+            </a:r>
+          </a:p>
+          <a:p>
+            <a:r>
+              <a:rPr lang="en-US" dirty="0"/>
+              <a:t>Many third-party libraries are “header only” libraries, meaning they are all templates</a:t>
+            </a:r>
+          </a:p>
+          <a:p>
+            <a:pPr lvl="1"/>
+            <a:r>
+              <a:rPr lang="en-US" dirty="0"/>
+              <a:t>Vendors must ship their libraries in source form (even if not open source)</a:t>
+            </a:r>
+          </a:p>
+        </p:txBody>
+      </p:sp>
+      <p:sp>
+        <p:nvSpPr>
+          <p:cNvPr id="4" name="TextBox 3">
+            <a:extLst>
+              <a:ext uri="{FF2B5EF4-FFF2-40B4-BE49-F238E27FC236}">
+                <a16:creationId xmlns:a16="http://schemas.microsoft.com/office/drawing/2014/main" id="{82F81939-85CA-2D00-4191-71C3F3D908E6}"/>
+              </a:ext>
+            </a:extLst>
+          </p:cNvPr>
+          <p:cNvSpPr txBox="1"/>
+          <p:nvPr/>
+        </p:nvSpPr>
+        <p:spPr>
+          <a:xfrm>
+            <a:off x="838200" y="1690688"/>
+            <a:ext cx="2337499" cy="1200329"/>
+          </a:xfrm>
+          <a:prstGeom prst="rect">
+            <a:avLst/>
+          </a:prstGeom>
+          <a:noFill/>
+        </p:spPr>
+        <p:txBody>
+          <a:bodyPr wrap="none" rtlCol="0">
+            <a:spAutoFit/>
+          </a:bodyPr>
+          <a:lstStyle/>
+          <a:p>
+            <a:r>
+              <a:rPr lang="en-US" dirty="0">
+                <a:latin typeface="Consolas" panose="020B0609020204030204" pitchFamily="49" charset="0"/>
+                <a:cs typeface="Consolas" panose="020B0609020204030204" pitchFamily="49" charset="0"/>
+              </a:rPr>
+              <a:t>#include &lt;map&gt;</a:t>
+            </a:r>
+          </a:p>
+          <a:p>
+            <a:r>
+              <a:rPr lang="en-US" dirty="0">
+                <a:latin typeface="Consolas" panose="020B0609020204030204" pitchFamily="49" charset="0"/>
+                <a:cs typeface="Consolas" panose="020B0609020204030204" pitchFamily="49" charset="0"/>
+              </a:rPr>
+              <a:t>#include &lt;set&gt;</a:t>
+            </a:r>
+          </a:p>
+          <a:p>
+            <a:r>
+              <a:rPr lang="en-US" dirty="0">
+                <a:latin typeface="Consolas" panose="020B0609020204030204" pitchFamily="49" charset="0"/>
+                <a:cs typeface="Consolas" panose="020B0609020204030204" pitchFamily="49" charset="0"/>
+              </a:rPr>
+              <a:t>#include &lt;string&gt;</a:t>
+            </a:r>
+          </a:p>
+          <a:p>
+            <a:r>
+              <a:rPr lang="en-US" dirty="0">
+                <a:latin typeface="Consolas" panose="020B0609020204030204" pitchFamily="49" charset="0"/>
+                <a:cs typeface="Consolas" panose="020B0609020204030204" pitchFamily="49" charset="0"/>
+              </a:rPr>
+              <a:t>#include &lt;vector&gt;</a:t>
+            </a:r>
+          </a:p>
+        </p:txBody>
+      </p:sp>
+      <p:sp>
+        <p:nvSpPr>
+          <p:cNvPr id="5" name="TextBox 4">
+            <a:extLst>
+              <a:ext uri="{FF2B5EF4-FFF2-40B4-BE49-F238E27FC236}">
+                <a16:creationId xmlns:a16="http://schemas.microsoft.com/office/drawing/2014/main" id="{367BB9CE-14D7-557E-E5FC-2B456CA64124}"/>
+              </a:ext>
+            </a:extLst>
+          </p:cNvPr>
+          <p:cNvSpPr txBox="1"/>
+          <p:nvPr/>
+        </p:nvSpPr>
+        <p:spPr>
+          <a:xfrm>
+            <a:off x="4305297" y="1967687"/>
+            <a:ext cx="4808560" cy="646331"/>
+          </a:xfrm>
+          <a:prstGeom prst="rect">
+            <a:avLst/>
+          </a:prstGeom>
+          <a:noFill/>
+        </p:spPr>
+        <p:txBody>
+          <a:bodyPr wrap="none" rtlCol="0">
+            <a:spAutoFit/>
+          </a:bodyPr>
+          <a:lstStyle/>
+          <a:p>
+            <a:pPr algn="ctr"/>
+            <a:r>
+              <a:rPr lang="en-US" dirty="0"/>
+              <a:t>All the code for all the methods is in the headers!</a:t>
+            </a:r>
+          </a:p>
+          <a:p>
+            <a:pPr algn="ctr"/>
+            <a:r>
+              <a:rPr lang="en-US" dirty="0"/>
+              <a:t>(yes, </a:t>
+            </a:r>
+            <a:r>
+              <a:rPr lang="en-US" dirty="0">
+                <a:latin typeface="Consolas" panose="020B0609020204030204" pitchFamily="49" charset="0"/>
+                <a:cs typeface="Consolas" panose="020B0609020204030204" pitchFamily="49" charset="0"/>
+              </a:rPr>
+              <a:t>std::string</a:t>
+            </a:r>
+            <a:r>
+              <a:rPr lang="en-US" dirty="0"/>
+              <a:t> is a template too)</a:t>
+            </a:r>
+          </a:p>
+        </p:txBody>
+      </p:sp>
+      <p:cxnSp>
+        <p:nvCxnSpPr>
+          <p:cNvPr id="7" name="Straight Arrow Connector 6">
+            <a:extLst>
+              <a:ext uri="{FF2B5EF4-FFF2-40B4-BE49-F238E27FC236}">
+                <a16:creationId xmlns:a16="http://schemas.microsoft.com/office/drawing/2014/main" id="{9805DDB8-14B6-82B9-B11E-19F02F297785}"/>
+              </a:ext>
+            </a:extLst>
+          </p:cNvPr>
+          <p:cNvCxnSpPr>
+            <a:cxnSpLocks/>
+            <a:stCxn id="5" idx="1"/>
+            <a:endCxn id="4" idx="3"/>
+          </p:cNvCxnSpPr>
+          <p:nvPr/>
+        </p:nvCxnSpPr>
+        <p:spPr>
+          <a:xfrm flipH="1">
+            <a:off x="3175699" y="2290853"/>
+            <a:ext cx="1129598" cy="0"/>
+          </a:xfrm>
+          <a:prstGeom prst="straightConnector1">
+            <a:avLst/>
+          </a:prstGeom>
+          <a:ln>
+            <a:tailEnd type="triangle"/>
+          </a:ln>
+        </p:spPr>
+        <p:style>
+          <a:lnRef idx="1">
+            <a:schemeClr val="accent1"/>
+          </a:lnRef>
+          <a:fillRef idx="0">
+            <a:schemeClr val="accent1"/>
+          </a:fillRef>
+          <a:effectRef idx="0">
+            <a:schemeClr val="accent1"/>
+          </a:effectRef>
+          <a:fontRef idx="minor">
+            <a:schemeClr val="tx1"/>
+          </a:fontRef>
+        </p:style>
+      </p:cxnSp>
+    </p:spTree>
+    <p:extLst>
+      <p:ext uri="{BB962C8B-B14F-4D97-AF65-F5344CB8AC3E}">
+        <p14:creationId xmlns:p14="http://schemas.microsoft.com/office/powerpoint/2010/main" val="1734273334"/>
+      </p:ext>
+    </p:extLst>
+  </p:cSld>
+  <p:clrMapOvr>
+    <a:masterClrMapping/>
+  </p:clrMapOvr>
+</p:sld>
+</file>
+
+<file path=ppt/slides/slide14.xml><?xml version="1.0" encoding="utf-8"?>
+<p:sld xmlns:a="http://schemas.openxmlformats.org/drawingml/2006/main" xmlns:r="http://schemas.openxmlformats.org/officeDocument/2006/relationships" xmlns:p="http://schemas.openxmlformats.org/presentationml/2006/main">
+  <p:cSld>
+    <p:spTree>
+      <p:nvGrpSpPr>
+        <p:cNvPr id="1" name=""/>
+        <p:cNvGrpSpPr/>
+        <p:nvPr/>
+      </p:nvGrpSpPr>
+      <p:grpSpPr>
+        <a:xfrm>
+          <a:off x="0" y="0"/>
+          <a:ext cx="0" cy="0"/>
+          <a:chOff x="0" y="0"/>
+          <a:chExt cx="0" cy="0"/>
+        </a:xfrm>
+      </p:grpSpPr>
+      <p:sp>
+        <p:nvSpPr>
+          <p:cNvPr id="2" name="Title 1">
+            <a:extLst>
+              <a:ext uri="{FF2B5EF4-FFF2-40B4-BE49-F238E27FC236}">
+                <a16:creationId xmlns:a16="http://schemas.microsoft.com/office/drawing/2014/main" id="{2893ABC7-8515-D705-23F6-F585E34C144C}"/>
+              </a:ext>
+            </a:extLst>
+          </p:cNvPr>
+          <p:cNvSpPr>
+            <a:spLocks noGrp="1"/>
+          </p:cNvSpPr>
+          <p:nvPr>
+            <p:ph type="title"/>
+          </p:nvPr>
+        </p:nvSpPr>
+        <p:spPr/>
+        <p:txBody>
+          <a:bodyPr/>
+          <a:lstStyle/>
+          <a:p>
+            <a:r>
+              <a:rPr lang="en-US" dirty="0"/>
+              <a:t>Spurious Includes</a:t>
+            </a:r>
+          </a:p>
+        </p:txBody>
+      </p:sp>
+      <p:sp>
+        <p:nvSpPr>
+          <p:cNvPr id="3" name="Content Placeholder 2">
+            <a:extLst>
+              <a:ext uri="{FF2B5EF4-FFF2-40B4-BE49-F238E27FC236}">
+                <a16:creationId xmlns:a16="http://schemas.microsoft.com/office/drawing/2014/main" id="{80D4A5C9-DB66-63E1-CC14-AD2F55AAE1DE}"/>
+              </a:ext>
+            </a:extLst>
+          </p:cNvPr>
+          <p:cNvSpPr>
+            <a:spLocks noGrp="1"/>
+          </p:cNvSpPr>
+          <p:nvPr>
+            <p:ph idx="1"/>
+          </p:nvPr>
+        </p:nvSpPr>
+        <p:spPr/>
+        <p:txBody>
+          <a:bodyPr/>
+          <a:lstStyle/>
+          <a:p>
+            <a:r>
+              <a:rPr lang="en-US" i="1" dirty="0"/>
+              <a:t>Finish Me!</a:t>
+            </a:r>
+          </a:p>
+        </p:txBody>
+      </p:sp>
+    </p:spTree>
+    <p:extLst>
+      <p:ext uri="{BB962C8B-B14F-4D97-AF65-F5344CB8AC3E}">
+        <p14:creationId xmlns:p14="http://schemas.microsoft.com/office/powerpoint/2010/main" val="1054393140"/>
+      </p:ext>
+    </p:extLst>
+  </p:cSld>
+  <p:clrMapOvr>
+    <a:masterClrMapping/>
+  </p:clrMapOvr>
+</p:sld>
+</file>
+
+<file path=ppt/slides/slide15.xml><?xml version="1.0" encoding="utf-8"?>
+<p:sld xmlns:a="http://schemas.openxmlformats.org/drawingml/2006/main" xmlns:r="http://schemas.openxmlformats.org/officeDocument/2006/relationships" xmlns:p="http://schemas.openxmlformats.org/presentationml/2006/main">
+  <p:cSld>
+    <p:spTree>
+      <p:nvGrpSpPr>
+        <p:cNvPr id="1" name=""/>
+        <p:cNvGrpSpPr/>
+        <p:nvPr/>
+      </p:nvGrpSpPr>
+      <p:grpSpPr>
+        <a:xfrm>
+          <a:off x="0" y="0"/>
+          <a:ext cx="0" cy="0"/>
+          <a:chOff x="0" y="0"/>
+          <a:chExt cx="0" cy="0"/>
+        </a:xfrm>
+      </p:grpSpPr>
+      <p:sp>
+        <p:nvSpPr>
+          <p:cNvPr id="2" name="Title 1">
+            <a:extLst>
+              <a:ext uri="{FF2B5EF4-FFF2-40B4-BE49-F238E27FC236}">
+                <a16:creationId xmlns:a16="http://schemas.microsoft.com/office/drawing/2014/main" id="{B16FE5B9-9DB7-7D1E-DBA9-F3AD64F175F7}"/>
+              </a:ext>
+            </a:extLst>
+          </p:cNvPr>
+          <p:cNvSpPr>
+            <a:spLocks noGrp="1"/>
+          </p:cNvSpPr>
+          <p:nvPr>
+            <p:ph type="title"/>
+          </p:nvPr>
+        </p:nvSpPr>
+        <p:spPr/>
+        <p:txBody>
+          <a:bodyPr/>
+          <a:lstStyle/>
+          <a:p>
+            <a:r>
+              <a:rPr lang="en-US" dirty="0"/>
+              <a:t>Modules</a:t>
+            </a:r>
+          </a:p>
+        </p:txBody>
+      </p:sp>
+      <p:sp>
+        <p:nvSpPr>
+          <p:cNvPr id="3" name="Content Placeholder 2">
+            <a:extLst>
+              <a:ext uri="{FF2B5EF4-FFF2-40B4-BE49-F238E27FC236}">
+                <a16:creationId xmlns:a16="http://schemas.microsoft.com/office/drawing/2014/main" id="{31414F40-FA48-15A2-B111-D12424497AA4}"/>
+              </a:ext>
+            </a:extLst>
+          </p:cNvPr>
+          <p:cNvSpPr>
+            <a:spLocks noGrp="1"/>
+          </p:cNvSpPr>
+          <p:nvPr>
+            <p:ph idx="1"/>
+          </p:nvPr>
+        </p:nvSpPr>
+        <p:spPr/>
+        <p:txBody>
+          <a:bodyPr/>
+          <a:lstStyle/>
+          <a:p>
+            <a:r>
+              <a:rPr lang="en-US" dirty="0"/>
+              <a:t>Starting with C++ 2020, there are now </a:t>
+            </a:r>
+            <a:r>
+              <a:rPr lang="en-US" i="1" dirty="0"/>
+              <a:t>modules</a:t>
+            </a:r>
+            <a:r>
+              <a:rPr lang="en-US" dirty="0"/>
+              <a:t> that deal with these problems</a:t>
+            </a:r>
+          </a:p>
+          <a:p>
+            <a:pPr lvl="1"/>
+            <a:r>
+              <a:rPr lang="en-US" dirty="0"/>
+              <a:t>There are </a:t>
+            </a:r>
+            <a:r>
+              <a:rPr lang="en-US" u="sng" dirty="0"/>
+              <a:t>no header files</a:t>
+            </a:r>
+            <a:r>
+              <a:rPr lang="en-US" dirty="0"/>
+              <a:t>, in the usual sense!</a:t>
+            </a:r>
+          </a:p>
+          <a:p>
+            <a:pPr lvl="1"/>
+            <a:r>
+              <a:rPr lang="en-US" dirty="0"/>
+              <a:t>There is </a:t>
+            </a:r>
+            <a:r>
+              <a:rPr lang="en-US" u="sng" dirty="0"/>
+              <a:t>no #include</a:t>
+            </a:r>
+            <a:r>
+              <a:rPr lang="en-US" dirty="0"/>
+              <a:t>!</a:t>
+            </a:r>
+          </a:p>
+          <a:p>
+            <a:r>
+              <a:rPr lang="en-US" dirty="0"/>
+              <a:t>Wait… isn’t that terribly incompatible?</a:t>
+            </a:r>
+          </a:p>
+          <a:p>
+            <a:pPr lvl="1"/>
+            <a:r>
+              <a:rPr lang="en-US" dirty="0"/>
+              <a:t>Yes, but…</a:t>
+            </a:r>
+          </a:p>
+          <a:p>
+            <a:pPr lvl="1"/>
+            <a:r>
+              <a:rPr lang="en-US" dirty="0"/>
+              <a:t>… it is permitted to keep using headers and #include as a transitional thing</a:t>
+            </a:r>
+          </a:p>
+          <a:p>
+            <a:pPr lvl="1"/>
+            <a:r>
+              <a:rPr lang="en-US" dirty="0"/>
+              <a:t>… mixing traditional headers and modules is (theoretically) possible</a:t>
+            </a:r>
+          </a:p>
+          <a:p>
+            <a:pPr lvl="1"/>
+            <a:r>
+              <a:rPr lang="en-US" dirty="0"/>
+              <a:t>… there are also things called </a:t>
+            </a:r>
+            <a:r>
+              <a:rPr lang="en-US" i="1" dirty="0"/>
+              <a:t>header units</a:t>
+            </a:r>
+            <a:r>
+              <a:rPr lang="en-US" dirty="0"/>
+              <a:t> which are midway between traditional headers and proper modules</a:t>
+            </a:r>
+          </a:p>
+        </p:txBody>
+      </p:sp>
+    </p:spTree>
+    <p:extLst>
+      <p:ext uri="{BB962C8B-B14F-4D97-AF65-F5344CB8AC3E}">
+        <p14:creationId xmlns:p14="http://schemas.microsoft.com/office/powerpoint/2010/main" val="1519628515"/>
+      </p:ext>
+    </p:extLst>
+  </p:cSld>
+  <p:clrMapOvr>
+    <a:masterClrMapping/>
+  </p:clrMapOvr>
+</p:sld>
+</file>
+
+<file path=ppt/slides/slide16.xml><?xml version="1.0" encoding="utf-8"?>
+<p:sld xmlns:a="http://schemas.openxmlformats.org/drawingml/2006/main" xmlns:r="http://schemas.openxmlformats.org/officeDocument/2006/relationships" xmlns:p="http://schemas.openxmlformats.org/presentationml/2006/main">
+  <p:cSld>
+    <p:spTree>
+      <p:nvGrpSpPr>
+        <p:cNvPr id="1" name=""/>
+        <p:cNvGrpSpPr/>
+        <p:nvPr/>
+      </p:nvGrpSpPr>
+      <p:grpSpPr>
+        <a:xfrm>
+          <a:off x="0" y="0"/>
+          <a:ext cx="0" cy="0"/>
+          <a:chOff x="0" y="0"/>
+          <a:chExt cx="0" cy="0"/>
+        </a:xfrm>
+      </p:grpSpPr>
+      <p:sp>
+        <p:nvSpPr>
+          <p:cNvPr id="2" name="Title 1">
+            <a:extLst>
+              <a:ext uri="{FF2B5EF4-FFF2-40B4-BE49-F238E27FC236}">
+                <a16:creationId xmlns:a16="http://schemas.microsoft.com/office/drawing/2014/main" id="{745055C4-9B4C-AAEE-7435-5E46B5D24296}"/>
+              </a:ext>
+            </a:extLst>
+          </p:cNvPr>
+          <p:cNvSpPr>
+            <a:spLocks noGrp="1"/>
+          </p:cNvSpPr>
+          <p:nvPr>
+            <p:ph type="title"/>
+          </p:nvPr>
+        </p:nvSpPr>
+        <p:spPr/>
+        <p:txBody>
+          <a:bodyPr/>
+          <a:lstStyle/>
+          <a:p>
+            <a:r>
+              <a:rPr lang="en-US" dirty="0"/>
+              <a:t>Unfortunately…</a:t>
+            </a:r>
+          </a:p>
+        </p:txBody>
+      </p:sp>
+      <p:sp>
+        <p:nvSpPr>
+          <p:cNvPr id="3" name="Content Placeholder 2">
+            <a:extLst>
+              <a:ext uri="{FF2B5EF4-FFF2-40B4-BE49-F238E27FC236}">
+                <a16:creationId xmlns:a16="http://schemas.microsoft.com/office/drawing/2014/main" id="{8D095AB9-B0D0-A850-6A83-A1F4258DAFAF}"/>
+              </a:ext>
+            </a:extLst>
+          </p:cNvPr>
+          <p:cNvSpPr>
+            <a:spLocks noGrp="1"/>
+          </p:cNvSpPr>
+          <p:nvPr>
+            <p:ph idx="1"/>
+          </p:nvPr>
+        </p:nvSpPr>
+        <p:spPr/>
+        <p:txBody>
+          <a:bodyPr/>
+          <a:lstStyle/>
+          <a:p>
+            <a:r>
+              <a:rPr lang="en-US" dirty="0"/>
+              <a:t>C++ 2020 does not require that the standard library be modularized</a:t>
+            </a:r>
+          </a:p>
+          <a:p>
+            <a:pPr lvl="1"/>
+            <a:r>
+              <a:rPr lang="en-US" i="1" dirty="0"/>
+              <a:t>It does not even require the vendor to provide header units</a:t>
+            </a:r>
+            <a:r>
+              <a:rPr lang="en-US" i="1" baseline="30000" dirty="0"/>
+              <a:t>*</a:t>
+            </a:r>
+            <a:r>
+              <a:rPr lang="en-US" i="1" dirty="0"/>
+              <a:t> for the standard library</a:t>
+            </a:r>
+            <a:r>
+              <a:rPr lang="en-US" dirty="0"/>
+              <a:t> (although you can compile your own)</a:t>
+            </a:r>
+          </a:p>
+          <a:p>
+            <a:r>
+              <a:rPr lang="en-US" dirty="0"/>
+              <a:t>C++ 2023 </a:t>
+            </a:r>
+            <a:r>
+              <a:rPr lang="en-US" i="1" dirty="0"/>
+              <a:t>does</a:t>
+            </a:r>
+            <a:r>
+              <a:rPr lang="en-US" dirty="0"/>
+              <a:t> require a standard module</a:t>
+            </a:r>
+          </a:p>
+        </p:txBody>
+      </p:sp>
+      <p:sp>
+        <p:nvSpPr>
+          <p:cNvPr id="4" name="TextBox 3">
+            <a:extLst>
+              <a:ext uri="{FF2B5EF4-FFF2-40B4-BE49-F238E27FC236}">
+                <a16:creationId xmlns:a16="http://schemas.microsoft.com/office/drawing/2014/main" id="{D817BABF-7630-2F7F-8540-057A067D7D99}"/>
+              </a:ext>
+            </a:extLst>
+          </p:cNvPr>
+          <p:cNvSpPr txBox="1"/>
+          <p:nvPr/>
+        </p:nvSpPr>
+        <p:spPr>
+          <a:xfrm>
+            <a:off x="3587749" y="6123543"/>
+            <a:ext cx="5016501" cy="369332"/>
+          </a:xfrm>
+          <a:prstGeom prst="rect">
+            <a:avLst/>
+          </a:prstGeom>
+          <a:noFill/>
+        </p:spPr>
+        <p:txBody>
+          <a:bodyPr wrap="none" rtlCol="0">
+            <a:spAutoFit/>
+          </a:bodyPr>
+          <a:lstStyle/>
+          <a:p>
+            <a:r>
+              <a:rPr lang="en-US" dirty="0"/>
+              <a:t>* Header units will be discussed more in later slides</a:t>
+            </a:r>
+          </a:p>
+        </p:txBody>
+      </p:sp>
+      <p:sp>
+        <p:nvSpPr>
+          <p:cNvPr id="5" name="TextBox 4">
+            <a:extLst>
+              <a:ext uri="{FF2B5EF4-FFF2-40B4-BE49-F238E27FC236}">
+                <a16:creationId xmlns:a16="http://schemas.microsoft.com/office/drawing/2014/main" id="{D3BAFF75-E103-BD81-72EB-96D934E026A8}"/>
+              </a:ext>
+            </a:extLst>
+          </p:cNvPr>
+          <p:cNvSpPr txBox="1"/>
+          <p:nvPr/>
+        </p:nvSpPr>
+        <p:spPr>
+          <a:xfrm>
+            <a:off x="1153885" y="3499307"/>
+            <a:ext cx="4110421" cy="2308324"/>
+          </a:xfrm>
+          <a:prstGeom prst="rect">
+            <a:avLst/>
+          </a:prstGeom>
+          <a:noFill/>
+        </p:spPr>
+        <p:txBody>
+          <a:bodyPr wrap="none" rtlCol="0">
+            <a:spAutoFit/>
+          </a:bodyPr>
+          <a:lstStyle/>
+          <a:p>
+            <a:r>
+              <a:rPr lang="en-US" dirty="0">
+                <a:latin typeface="Consolas" panose="020B0609020204030204" pitchFamily="49" charset="0"/>
+                <a:cs typeface="Consolas" panose="020B0609020204030204" pitchFamily="49" charset="0"/>
+              </a:rPr>
+              <a:t>// This is C++ 2023</a:t>
+            </a:r>
+          </a:p>
+          <a:p>
+            <a:endParaRPr lang="en-US" dirty="0">
+              <a:latin typeface="Consolas" panose="020B0609020204030204" pitchFamily="49" charset="0"/>
+              <a:cs typeface="Consolas" panose="020B0609020204030204" pitchFamily="49" charset="0"/>
+            </a:endParaRPr>
+          </a:p>
+          <a:p>
+            <a:r>
+              <a:rPr lang="en-US" b="1" dirty="0">
+                <a:latin typeface="Consolas" panose="020B0609020204030204" pitchFamily="49" charset="0"/>
+                <a:cs typeface="Consolas" panose="020B0609020204030204" pitchFamily="49" charset="0"/>
+              </a:rPr>
+              <a:t>import</a:t>
+            </a:r>
+            <a:r>
+              <a:rPr lang="en-US" dirty="0">
+                <a:latin typeface="Consolas" panose="020B0609020204030204" pitchFamily="49" charset="0"/>
+                <a:cs typeface="Consolas" panose="020B0609020204030204" pitchFamily="49" charset="0"/>
+              </a:rPr>
+              <a:t> std;</a:t>
+            </a:r>
+          </a:p>
+          <a:p>
+            <a:endParaRPr lang="en-US" dirty="0">
+              <a:latin typeface="Consolas" panose="020B0609020204030204" pitchFamily="49" charset="0"/>
+              <a:cs typeface="Consolas" panose="020B0609020204030204" pitchFamily="49" charset="0"/>
+            </a:endParaRPr>
+          </a:p>
+          <a:p>
+            <a:r>
+              <a:rPr lang="en-US" b="1" dirty="0">
+                <a:latin typeface="Consolas" panose="020B0609020204030204" pitchFamily="49" charset="0"/>
+                <a:cs typeface="Consolas" panose="020B0609020204030204" pitchFamily="49" charset="0"/>
+              </a:rPr>
+              <a:t>int</a:t>
+            </a:r>
+            <a:r>
+              <a:rPr lang="en-US" dirty="0">
+                <a:latin typeface="Consolas" panose="020B0609020204030204" pitchFamily="49" charset="0"/>
+                <a:cs typeface="Consolas" panose="020B0609020204030204" pitchFamily="49" charset="0"/>
+              </a:rPr>
+              <a:t> main( )</a:t>
+            </a:r>
+          </a:p>
+          <a:p>
+            <a:r>
+              <a:rPr lang="en-US" dirty="0">
+                <a:latin typeface="Consolas" panose="020B0609020204030204" pitchFamily="49" charset="0"/>
+                <a:cs typeface="Consolas" panose="020B0609020204030204" pitchFamily="49" charset="0"/>
+              </a:rPr>
+              <a:t>{</a:t>
+            </a:r>
+          </a:p>
+          <a:p>
+            <a:r>
+              <a:rPr lang="en-US" dirty="0">
+                <a:latin typeface="Consolas" panose="020B0609020204030204" pitchFamily="49" charset="0"/>
+                <a:cs typeface="Consolas" panose="020B0609020204030204" pitchFamily="49" charset="0"/>
+              </a:rPr>
+              <a:t>    std::vector&lt;</a:t>
+            </a:r>
+            <a:r>
+              <a:rPr lang="en-US" b="1" dirty="0">
+                <a:latin typeface="Consolas" panose="020B0609020204030204" pitchFamily="49" charset="0"/>
+                <a:cs typeface="Consolas" panose="020B0609020204030204" pitchFamily="49" charset="0"/>
+              </a:rPr>
+              <a:t>int</a:t>
+            </a:r>
+            <a:r>
+              <a:rPr lang="en-US" dirty="0">
+                <a:latin typeface="Consolas" panose="020B0609020204030204" pitchFamily="49" charset="0"/>
+                <a:cs typeface="Consolas" panose="020B0609020204030204" pitchFamily="49" charset="0"/>
+              </a:rPr>
+              <a:t>&gt; </a:t>
+            </a:r>
+            <a:r>
+              <a:rPr lang="en-US" dirty="0" err="1">
+                <a:latin typeface="Consolas" panose="020B0609020204030204" pitchFamily="49" charset="0"/>
+                <a:cs typeface="Consolas" panose="020B0609020204030204" pitchFamily="49" charset="0"/>
+              </a:rPr>
+              <a:t>my_vector</a:t>
+            </a:r>
+            <a:r>
+              <a:rPr lang="en-US" dirty="0">
+                <a:latin typeface="Consolas" panose="020B0609020204030204" pitchFamily="49" charset="0"/>
+                <a:cs typeface="Consolas" panose="020B0609020204030204" pitchFamily="49" charset="0"/>
+              </a:rPr>
+              <a:t>;</a:t>
+            </a:r>
+          </a:p>
+          <a:p>
+            <a:r>
+              <a:rPr lang="en-US" dirty="0">
+                <a:latin typeface="Consolas" panose="020B0609020204030204" pitchFamily="49" charset="0"/>
+                <a:cs typeface="Consolas" panose="020B0609020204030204" pitchFamily="49" charset="0"/>
+              </a:rPr>
+              <a:t>}</a:t>
+            </a:r>
+          </a:p>
+        </p:txBody>
+      </p:sp>
+      <p:sp>
+        <p:nvSpPr>
+          <p:cNvPr id="6" name="TextBox 5">
+            <a:extLst>
+              <a:ext uri="{FF2B5EF4-FFF2-40B4-BE49-F238E27FC236}">
+                <a16:creationId xmlns:a16="http://schemas.microsoft.com/office/drawing/2014/main" id="{84C624C8-C225-1303-B38A-0575497DB6BE}"/>
+              </a:ext>
+            </a:extLst>
+          </p:cNvPr>
+          <p:cNvSpPr txBox="1"/>
+          <p:nvPr/>
+        </p:nvSpPr>
+        <p:spPr>
+          <a:xfrm>
+            <a:off x="3733800" y="4018417"/>
+            <a:ext cx="3964227" cy="369332"/>
+          </a:xfrm>
+          <a:prstGeom prst="rect">
+            <a:avLst/>
+          </a:prstGeom>
+          <a:noFill/>
+        </p:spPr>
+        <p:txBody>
+          <a:bodyPr wrap="none" rtlCol="0">
+            <a:spAutoFit/>
+          </a:bodyPr>
+          <a:lstStyle/>
+          <a:p>
+            <a:r>
+              <a:rPr lang="en-US" dirty="0"/>
+              <a:t>Makes the whole standard library visible</a:t>
+            </a:r>
+          </a:p>
+        </p:txBody>
+      </p:sp>
+      <p:sp>
+        <p:nvSpPr>
+          <p:cNvPr id="7" name="TextBox 6">
+            <a:extLst>
+              <a:ext uri="{FF2B5EF4-FFF2-40B4-BE49-F238E27FC236}">
+                <a16:creationId xmlns:a16="http://schemas.microsoft.com/office/drawing/2014/main" id="{B8337242-6E5C-9532-6458-E19A47C8DF49}"/>
+              </a:ext>
+            </a:extLst>
+          </p:cNvPr>
+          <p:cNvSpPr txBox="1"/>
+          <p:nvPr/>
+        </p:nvSpPr>
+        <p:spPr>
+          <a:xfrm>
+            <a:off x="5264306" y="4517069"/>
+            <a:ext cx="5698355" cy="646331"/>
+          </a:xfrm>
+          <a:prstGeom prst="rect">
+            <a:avLst/>
+          </a:prstGeom>
+          <a:noFill/>
+        </p:spPr>
+        <p:txBody>
+          <a:bodyPr wrap="none" rtlCol="0">
+            <a:spAutoFit/>
+          </a:bodyPr>
+          <a:lstStyle/>
+          <a:p>
+            <a:r>
+              <a:rPr lang="en-US" dirty="0"/>
+              <a:t>Still necessary to qualify names.</a:t>
+            </a:r>
+          </a:p>
+          <a:p>
+            <a:r>
+              <a:rPr lang="en-US" dirty="0"/>
+              <a:t>Module </a:t>
+            </a:r>
+            <a:r>
+              <a:rPr lang="en-US" dirty="0">
+                <a:latin typeface="Consolas" panose="020B0609020204030204" pitchFamily="49" charset="0"/>
+                <a:cs typeface="Consolas" panose="020B0609020204030204" pitchFamily="49" charset="0"/>
+              </a:rPr>
+              <a:t>std</a:t>
+            </a:r>
+            <a:r>
+              <a:rPr lang="en-US" dirty="0"/>
+              <a:t> and name space </a:t>
+            </a:r>
+            <a:r>
+              <a:rPr lang="en-US" dirty="0">
+                <a:latin typeface="Consolas" panose="020B0609020204030204" pitchFamily="49" charset="0"/>
+                <a:cs typeface="Consolas" panose="020B0609020204030204" pitchFamily="49" charset="0"/>
+              </a:rPr>
+              <a:t>std</a:t>
+            </a:r>
+            <a:r>
+              <a:rPr lang="en-US" dirty="0"/>
+              <a:t> are two different things!</a:t>
+            </a:r>
+          </a:p>
+        </p:txBody>
+      </p:sp>
+      <p:cxnSp>
+        <p:nvCxnSpPr>
+          <p:cNvPr id="9" name="Straight Arrow Connector 8">
+            <a:extLst>
+              <a:ext uri="{FF2B5EF4-FFF2-40B4-BE49-F238E27FC236}">
+                <a16:creationId xmlns:a16="http://schemas.microsoft.com/office/drawing/2014/main" id="{E159272F-159C-5D25-23B5-A5CC7AD295AE}"/>
+              </a:ext>
+            </a:extLst>
+          </p:cNvPr>
+          <p:cNvCxnSpPr>
+            <a:stCxn id="6" idx="1"/>
+          </p:cNvCxnSpPr>
+          <p:nvPr/>
+        </p:nvCxnSpPr>
+        <p:spPr>
+          <a:xfrm flipH="1">
+            <a:off x="2732314" y="4203083"/>
+            <a:ext cx="1001486" cy="0"/>
+          </a:xfrm>
+          <a:prstGeom prst="straightConnector1">
+            <a:avLst/>
+          </a:prstGeom>
+          <a:ln>
+            <a:tailEnd type="triangle"/>
+          </a:ln>
+        </p:spPr>
+        <p:style>
+          <a:lnRef idx="1">
+            <a:schemeClr val="accent1"/>
+          </a:lnRef>
+          <a:fillRef idx="0">
+            <a:schemeClr val="accent1"/>
+          </a:fillRef>
+          <a:effectRef idx="0">
+            <a:schemeClr val="accent1"/>
+          </a:effectRef>
+          <a:fontRef idx="minor">
+            <a:schemeClr val="tx1"/>
+          </a:fontRef>
+        </p:style>
+      </p:cxnSp>
+      <p:cxnSp>
+        <p:nvCxnSpPr>
+          <p:cNvPr id="11" name="Straight Arrow Connector 10">
+            <a:extLst>
+              <a:ext uri="{FF2B5EF4-FFF2-40B4-BE49-F238E27FC236}">
+                <a16:creationId xmlns:a16="http://schemas.microsoft.com/office/drawing/2014/main" id="{87A1DF6F-CB82-1C0E-2167-99625807008E}"/>
+              </a:ext>
+            </a:extLst>
+          </p:cNvPr>
+          <p:cNvCxnSpPr>
+            <a:stCxn id="7" idx="1"/>
+          </p:cNvCxnSpPr>
+          <p:nvPr/>
+        </p:nvCxnSpPr>
+        <p:spPr>
+          <a:xfrm flipH="1">
+            <a:off x="3004457" y="4840235"/>
+            <a:ext cx="2259849" cy="323165"/>
+          </a:xfrm>
+          <a:prstGeom prst="straightConnector1">
+            <a:avLst/>
+          </a:prstGeom>
+          <a:ln>
+            <a:tailEnd type="triangle"/>
+          </a:ln>
+        </p:spPr>
+        <p:style>
+          <a:lnRef idx="1">
+            <a:schemeClr val="accent1"/>
+          </a:lnRef>
+          <a:fillRef idx="0">
+            <a:schemeClr val="accent1"/>
+          </a:fillRef>
+          <a:effectRef idx="0">
+            <a:schemeClr val="accent1"/>
+          </a:effectRef>
+          <a:fontRef idx="minor">
+            <a:schemeClr val="tx1"/>
+          </a:fontRef>
+        </p:style>
+      </p:cxnSp>
+    </p:spTree>
+    <p:extLst>
+      <p:ext uri="{BB962C8B-B14F-4D97-AF65-F5344CB8AC3E}">
+        <p14:creationId xmlns:p14="http://schemas.microsoft.com/office/powerpoint/2010/main" val="1094753967"/>
+      </p:ext>
+    </p:extLst>
+  </p:cSld>
+  <p:clrMapOvr>
+    <a:masterClrMapping/>
+  </p:clrMapOvr>
+</p:sld>
+</file>
+
+<file path=ppt/slides/slide17.xml><?xml version="1.0" encoding="utf-8"?>
+<p:sld xmlns:a="http://schemas.openxmlformats.org/drawingml/2006/main" xmlns:r="http://schemas.openxmlformats.org/officeDocument/2006/relationships" xmlns:p="http://schemas.openxmlformats.org/presentationml/2006/main">
+  <p:cSld>
+    <p:spTree>
+      <p:nvGrpSpPr>
+        <p:cNvPr id="1" name=""/>
+        <p:cNvGrpSpPr/>
+        <p:nvPr/>
+      </p:nvGrpSpPr>
+      <p:grpSpPr>
+        <a:xfrm>
+          <a:off x="0" y="0"/>
+          <a:ext cx="0" cy="0"/>
+          <a:chOff x="0" y="0"/>
+          <a:chExt cx="0" cy="0"/>
+        </a:xfrm>
+      </p:grpSpPr>
+      <p:sp>
+        <p:nvSpPr>
+          <p:cNvPr id="2" name="Title 1">
+            <a:extLst>
+              <a:ext uri="{FF2B5EF4-FFF2-40B4-BE49-F238E27FC236}">
+                <a16:creationId xmlns:a16="http://schemas.microsoft.com/office/drawing/2014/main" id="{D62FEE9A-E0AF-6BC9-5A6D-841086159F79}"/>
+              </a:ext>
+            </a:extLst>
+          </p:cNvPr>
+          <p:cNvSpPr>
+            <a:spLocks noGrp="1"/>
+          </p:cNvSpPr>
+          <p:nvPr>
+            <p:ph type="title"/>
+          </p:nvPr>
+        </p:nvSpPr>
+        <p:spPr/>
+        <p:txBody>
+          <a:bodyPr/>
+          <a:lstStyle/>
+          <a:p>
+            <a:r>
+              <a:rPr lang="en-US" dirty="0"/>
+              <a:t>Modules Are Not Name Spaces</a:t>
+            </a:r>
+          </a:p>
+        </p:txBody>
+      </p:sp>
+      <p:sp>
+        <p:nvSpPr>
+          <p:cNvPr id="3" name="Content Placeholder 2">
+            <a:extLst>
+              <a:ext uri="{FF2B5EF4-FFF2-40B4-BE49-F238E27FC236}">
+                <a16:creationId xmlns:a16="http://schemas.microsoft.com/office/drawing/2014/main" id="{6D29A4B5-1C06-EC6D-1FA9-718FB3902EC1}"/>
+              </a:ext>
+            </a:extLst>
+          </p:cNvPr>
+          <p:cNvSpPr>
+            <a:spLocks noGrp="1"/>
+          </p:cNvSpPr>
+          <p:nvPr>
+            <p:ph idx="1"/>
+          </p:nvPr>
+        </p:nvSpPr>
+        <p:spPr/>
+        <p:txBody>
+          <a:bodyPr/>
+          <a:lstStyle/>
+          <a:p>
+            <a:r>
+              <a:rPr lang="en-US" dirty="0"/>
+              <a:t>In most languages modules (or packages or whatever) are also used for name space control. This is not the case in C++</a:t>
+            </a:r>
+          </a:p>
+          <a:p>
+            <a:r>
+              <a:rPr lang="en-US" dirty="0"/>
+              <a:t>C++ already has a name space feature (since 1998). Modules do not impose any restrictions or requirements on the name spaces</a:t>
+            </a:r>
+          </a:p>
+          <a:p>
+            <a:r>
+              <a:rPr lang="en-US" dirty="0">
+                <a:latin typeface="Consolas" panose="020B0609020204030204" pitchFamily="49" charset="0"/>
+                <a:cs typeface="Consolas" panose="020B0609020204030204" pitchFamily="49" charset="0"/>
+              </a:rPr>
+              <a:t>import </a:t>
+            </a:r>
+            <a:r>
+              <a:rPr lang="en-US" dirty="0" err="1">
+                <a:latin typeface="Consolas" panose="020B0609020204030204" pitchFamily="49" charset="0"/>
+                <a:cs typeface="Consolas" panose="020B0609020204030204" pitchFamily="49" charset="0"/>
+              </a:rPr>
+              <a:t>my_module</a:t>
+            </a:r>
+            <a:r>
+              <a:rPr lang="en-US" dirty="0">
+                <a:latin typeface="Consolas" panose="020B0609020204030204" pitchFamily="49" charset="0"/>
+                <a:cs typeface="Consolas" panose="020B0609020204030204" pitchFamily="49" charset="0"/>
+              </a:rPr>
+              <a:t>;</a:t>
+            </a:r>
+          </a:p>
+          <a:p>
+            <a:pPr lvl="1"/>
+            <a:r>
+              <a:rPr lang="en-US" dirty="0"/>
+              <a:t>This may (or may not) introduce a name space</a:t>
+            </a:r>
+          </a:p>
+          <a:p>
+            <a:pPr lvl="1"/>
+            <a:r>
+              <a:rPr lang="en-US" dirty="0"/>
+              <a:t>The name space may (or may not) be the same name as the module</a:t>
+            </a:r>
+          </a:p>
+          <a:p>
+            <a:pPr lvl="1"/>
+            <a:r>
+              <a:rPr lang="en-US" dirty="0"/>
+              <a:t>The module may (or may not) contain multiple name spaces</a:t>
+            </a:r>
+          </a:p>
+          <a:p>
+            <a:r>
+              <a:rPr lang="en-US" dirty="0"/>
+              <a:t>If you care about name spaces (you do), you must use the existing mechanism inside the modules to arrange for them</a:t>
+            </a:r>
+          </a:p>
+        </p:txBody>
+      </p:sp>
+    </p:spTree>
+    <p:extLst>
+      <p:ext uri="{BB962C8B-B14F-4D97-AF65-F5344CB8AC3E}">
+        <p14:creationId xmlns:p14="http://schemas.microsoft.com/office/powerpoint/2010/main" val="1070978425"/>
+      </p:ext>
+    </p:extLst>
+  </p:cSld>
+  <p:clrMapOvr>
+    <a:masterClrMapping/>
+  </p:clrMapOvr>
+</p:sld>
+</file>
+
+<file path=ppt/slides/slide18.xml><?xml version="1.0" encoding="utf-8"?>
+<p:sld xmlns:a="http://schemas.openxmlformats.org/drawingml/2006/main" xmlns:r="http://schemas.openxmlformats.org/officeDocument/2006/relationships" xmlns:p="http://schemas.openxmlformats.org/presentationml/2006/main">
+  <p:cSld>
+    <p:spTree>
+      <p:nvGrpSpPr>
+        <p:cNvPr id="1" name=""/>
+        <p:cNvGrpSpPr/>
+        <p:nvPr/>
+      </p:nvGrpSpPr>
+      <p:grpSpPr>
+        <a:xfrm>
+          <a:off x="0" y="0"/>
+          <a:ext cx="0" cy="0"/>
+          <a:chOff x="0" y="0"/>
+          <a:chExt cx="0" cy="0"/>
+        </a:xfrm>
+      </p:grpSpPr>
+      <p:sp>
+        <p:nvSpPr>
+          <p:cNvPr id="2" name="Title 1">
+            <a:extLst>
+              <a:ext uri="{FF2B5EF4-FFF2-40B4-BE49-F238E27FC236}">
+                <a16:creationId xmlns:a16="http://schemas.microsoft.com/office/drawing/2014/main" id="{938D4E87-5F4C-5F59-A5E6-DD59EADB64F8}"/>
+              </a:ext>
+            </a:extLst>
+          </p:cNvPr>
+          <p:cNvSpPr>
+            <a:spLocks noGrp="1"/>
+          </p:cNvSpPr>
+          <p:nvPr>
+            <p:ph type="title"/>
+          </p:nvPr>
+        </p:nvSpPr>
+        <p:spPr/>
+        <p:txBody>
+          <a:bodyPr/>
+          <a:lstStyle/>
+          <a:p>
+            <a:r>
+              <a:rPr lang="en-US" dirty="0"/>
+              <a:t>So, What’s the Point of Modules?</a:t>
+            </a:r>
+          </a:p>
+        </p:txBody>
+      </p:sp>
+      <p:sp>
+        <p:nvSpPr>
+          <p:cNvPr id="3" name="Content Placeholder 2">
+            <a:extLst>
+              <a:ext uri="{FF2B5EF4-FFF2-40B4-BE49-F238E27FC236}">
+                <a16:creationId xmlns:a16="http://schemas.microsoft.com/office/drawing/2014/main" id="{C9D5D6C0-8BE9-490B-4261-DCF8CE12316A}"/>
+              </a:ext>
+            </a:extLst>
+          </p:cNvPr>
+          <p:cNvSpPr>
+            <a:spLocks noGrp="1"/>
+          </p:cNvSpPr>
+          <p:nvPr>
+            <p:ph idx="1"/>
+          </p:nvPr>
+        </p:nvSpPr>
+        <p:spPr/>
+        <p:txBody>
+          <a:bodyPr/>
+          <a:lstStyle/>
+          <a:p>
+            <a:r>
+              <a:rPr lang="en-US" dirty="0"/>
+              <a:t>Modules allow you to gather related code into separately compiled units that are isolated from each other</a:t>
+            </a:r>
+          </a:p>
+          <a:p>
+            <a:pPr lvl="1"/>
+            <a:r>
+              <a:rPr lang="en-US" dirty="0"/>
+              <a:t>No bleed-over of macro names</a:t>
+            </a:r>
+          </a:p>
+          <a:p>
+            <a:pPr lvl="1"/>
+            <a:r>
+              <a:rPr lang="en-US" dirty="0"/>
+              <a:t>No spurious includes in user translation units</a:t>
+            </a:r>
+          </a:p>
+          <a:p>
+            <a:r>
+              <a:rPr lang="en-US" dirty="0"/>
+              <a:t>Modules are compiled once and for all</a:t>
+            </a:r>
+          </a:p>
+          <a:p>
+            <a:pPr lvl="1"/>
+            <a:r>
+              <a:rPr lang="en-US" dirty="0"/>
+              <a:t>Importing a module is fast because the compiler does not need to parse and analyze the module code over and over for each TU that imports the module</a:t>
+            </a:r>
+          </a:p>
+          <a:p>
+            <a:pPr lvl="1"/>
+            <a:r>
+              <a:rPr lang="en-US" dirty="0"/>
+              <a:t>This is why a single </a:t>
+            </a:r>
+            <a:r>
+              <a:rPr lang="en-US" dirty="0">
+                <a:latin typeface="Consolas" panose="020B0609020204030204" pitchFamily="49" charset="0"/>
+                <a:cs typeface="Consolas" panose="020B0609020204030204" pitchFamily="49" charset="0"/>
+              </a:rPr>
+              <a:t>import std</a:t>
+            </a:r>
+            <a:r>
+              <a:rPr lang="en-US" dirty="0"/>
+              <a:t> is reasonable despite the large size of the standard library!</a:t>
+            </a:r>
+          </a:p>
+          <a:p>
+            <a:r>
+              <a:rPr lang="en-US" dirty="0"/>
+              <a:t>Modules offer some protection of source code (for closed source)</a:t>
+            </a:r>
+          </a:p>
+        </p:txBody>
+      </p:sp>
+    </p:spTree>
+    <p:extLst>
+      <p:ext uri="{BB962C8B-B14F-4D97-AF65-F5344CB8AC3E}">
+        <p14:creationId xmlns:p14="http://schemas.microsoft.com/office/powerpoint/2010/main" val="54384230"/>
       </p:ext>
     </p:extLst>
   </p:cSld>
@@ -3671,7 +5647,7 @@
           </a:p>
           <a:p>
             <a:r>
-              <a:rPr lang="en-US" i="1" dirty="0"/>
+              <a:rPr lang="en-US" dirty="0"/>
               <a:t>Definitions are also declarations!</a:t>
             </a:r>
           </a:p>
@@ -3815,7 +5791,18 @@
             <a:pPr lvl="1"/>
             <a:r>
               <a:rPr lang="en-US" dirty="0"/>
-              <a:t>Global objects have default initial values. The extern reserved word is what signals that you are dealing with “only” a declaration.</a:t>
+              <a:t>Global objects have default initial values. The </a:t>
+            </a:r>
+            <a:r>
+              <a:rPr lang="en-US" dirty="0">
+                <a:latin typeface="Courier New" panose="02070309020205020404" pitchFamily="49" charset="0"/>
+                <a:cs typeface="Courier New" panose="02070309020205020404" pitchFamily="49" charset="0"/>
+              </a:rPr>
+              <a:t>extern</a:t>
+            </a:r>
+            <a:r>
+              <a:rPr lang="en-US" dirty="0"/>
+              <a:t> reserved word is what signals that you are dealing with “only” a declaration.</a:t>
             </a:r>
           </a:p>
           <a:p>
@@ -3956,8 +5943,8 @@
         </p:nvSpPr>
         <p:spPr>
           <a:xfrm>
-            <a:off x="2606070" y="6123543"/>
-            <a:ext cx="6979859" cy="369332"/>
+            <a:off x="2465583" y="6127234"/>
+            <a:ext cx="7260834" cy="369332"/>
           </a:xfrm>
           <a:prstGeom prst="rect">
             <a:avLst/>
@@ -3972,7 +5959,18 @@
           <a:p>
             <a:r>
               <a:rPr lang="en-US" dirty="0"/>
-              <a:t>* For functions the extern reserved word is optional, and it is rarely used.</a:t>
+              <a:t>* For functions the </a:t>
+            </a:r>
+            <a:r>
+              <a:rPr lang="en-US" dirty="0">
+                <a:latin typeface="Courier New" panose="02070309020205020404" pitchFamily="49" charset="0"/>
+                <a:cs typeface="Courier New" panose="02070309020205020404" pitchFamily="49" charset="0"/>
+              </a:rPr>
+              <a:t>extern</a:t>
+            </a:r>
+            <a:r>
+              <a:rPr lang="en-US" dirty="0"/>
+              <a:t> reserved word is optional, and it is rarely used.</a:t>
             </a:r>
           </a:p>
         </p:txBody>
@@ -4071,27 +6069,31 @@
           <a:p>
             <a:r>
               <a:rPr lang="en-US" dirty="0"/>
-              <a:t>However, when compiling a translation unit (TU), the compiler does not need to know where declared entities are defined.</a:t>
+              <a:t>However, when compiling a translation unit (TU), the compiler does not need to know where declared entities are defined…</a:t>
             </a:r>
           </a:p>
           <a:p>
             <a:pPr lvl="1"/>
             <a:r>
               <a:rPr lang="en-US" dirty="0"/>
-              <a:t>Or even if they are defined at all!</a:t>
-            </a:r>
-          </a:p>
-          <a:p>
-            <a:r>
-              <a:rPr lang="en-US" dirty="0"/>
-              <a:t>The link “resolves the external references” by connecting usages of declared entities with their definitions.</a:t>
+              <a:t>… or even if they are defined at all!</a:t>
+            </a:r>
+          </a:p>
+          <a:p>
+            <a:r>
+              <a:rPr lang="en-US" dirty="0"/>
+              <a:t>The linker “resolves the external references” by connecting usages of declared entities with their definitions.</a:t>
             </a:r>
           </a:p>
           <a:p>
             <a:pPr lvl="1"/>
             <a:r>
-              <a:rPr lang="en-US" dirty="0"/>
-              <a:t>It’s what linkers do.</a:t>
+              <a:rPr lang="en-US" i="1" dirty="0"/>
+              <a:t>It’s what linkers do</a:t>
+            </a:r>
+            <a:r>
+              <a:rPr lang="en-US" dirty="0"/>
+              <a:t>.</a:t>
             </a:r>
           </a:p>
         </p:txBody>
@@ -4292,7 +6294,7 @@
             <a:pPr lvl="2"/>
             <a:r>
               <a:rPr lang="en-US" dirty="0"/>
-              <a:t>No methods can be used (compiler doesn’t know what they are)</a:t>
+              <a:t>No methods can be used (compiler doesn’t know what they are yet)</a:t>
             </a:r>
           </a:p>
         </p:txBody>
@@ -5089,14 +7091,30 @@
             <a:pPr lvl="1"/>
             <a:r>
               <a:rPr lang="en-US" dirty="0"/>
-              <a:t>#include header files into the TUs that need to see those declarations.</a:t>
+              <a:t>#include header files into the TUs that need to see those </a:t>
+            </a:r>
+            <a:r>
+              <a:rPr lang="en-US" i="1" dirty="0"/>
+              <a:t>declarations</a:t>
+            </a:r>
+            <a:r>
+              <a:rPr lang="en-US" dirty="0"/>
+              <a:t>.</a:t>
             </a:r>
           </a:p>
           <a:p>
             <a:pPr lvl="1"/>
             <a:r>
               <a:rPr lang="en-US" dirty="0"/>
-              <a:t>Leave the definitions in the implementation files (*.</a:t>
+              <a:t>Leave the </a:t>
+            </a:r>
+            <a:r>
+              <a:rPr lang="en-US" i="1" dirty="0"/>
+              <a:t>definitions</a:t>
+            </a:r>
+            <a:r>
+              <a:rPr lang="en-US" dirty="0"/>
+              <a:t> in the implementation files (*.</a:t>
             </a:r>
             <a:r>
               <a:rPr lang="en-US" dirty="0" err="1"/>
@@ -5177,7 +7195,7 @@
           <a:p>
             <a:r>
               <a:rPr lang="en-US" dirty="0"/>
-              <a:t>Unfortunately</a:t>
+              <a:t>Unfortunately…</a:t>
             </a:r>
           </a:p>
         </p:txBody>
@@ -5215,21 +7233,21 @@
             </a:r>
             <a:r>
               <a:rPr lang="en-US" dirty="0"/>
-              <a:t> in header files</a:t>
+              <a:t> in header files…</a:t>
             </a:r>
           </a:p>
           <a:p>
             <a:pPr lvl="1"/>
             <a:r>
               <a:rPr lang="en-US" dirty="0"/>
-              <a:t>So the compiler can know how much memory they consume</a:t>
+              <a:t>… so the compiler can know how much memory the objects consume</a:t>
             </a:r>
           </a:p>
           <a:p>
             <a:pPr lvl="1"/>
             <a:r>
               <a:rPr lang="en-US" dirty="0"/>
-              <a:t>So the compiler can know what methods they have</a:t>
+              <a:t>… so the compiler can know what methods they have</a:t>
             </a:r>
           </a:p>
           <a:p>
@@ -5243,14 +7261,14 @@
             </a:r>
             <a:r>
               <a:rPr lang="en-US" dirty="0"/>
-              <a:t> in header files</a:t>
+              <a:t> in header files…</a:t>
             </a:r>
           </a:p>
           <a:p>
             <a:pPr lvl="1"/>
             <a:r>
               <a:rPr lang="en-US" dirty="0"/>
-              <a:t>So the compiler can expand their bodies at the call sites</a:t>
+              <a:t>… so the compiler can expand their bodies at the call sites</a:t>
             </a:r>
           </a:p>
           <a:p>
@@ -5264,21 +7282,21 @@
             </a:r>
             <a:r>
               <a:rPr lang="en-US" dirty="0"/>
-              <a:t> in header files</a:t>
+              <a:t> in header files…</a:t>
             </a:r>
           </a:p>
           <a:p>
             <a:pPr lvl="1"/>
             <a:r>
               <a:rPr lang="en-US" dirty="0"/>
-              <a:t>So the compiler can generate the needed specializations.</a:t>
+              <a:t>… so the compiler can generate the needed specializations</a:t>
             </a:r>
           </a:p>
           <a:p>
             <a:pPr lvl="1"/>
             <a:r>
               <a:rPr lang="en-US" dirty="0"/>
-              <a:t>C++ 98 had a feature called “exported templates” that was supposed to address this, but it was very difficult to implement, and no compiler vendor (almost) even tried. The feature was dropped in C++ 2011.</a:t>
+              <a:t>C++ 98 had a feature called “exported templates” that was supposed to address this, but it was very difficult to implement, and almost no compiler vendor even tried. The feature was dropped in C++ 2011.</a:t>
             </a:r>
           </a:p>
         </p:txBody>

</xml_diff>

<commit_message>
More updates to the presentation on modules.
</commit_message>
<xml_diff>
--- a/Presentations/Modules.pptx
+++ b/Presentations/Modules.pptx
@@ -23,6 +23,17 @@
     <p:sldId id="270" r:id="rId17"/>
     <p:sldId id="271" r:id="rId18"/>
     <p:sldId id="272" r:id="rId19"/>
+    <p:sldId id="274" r:id="rId20"/>
+    <p:sldId id="275" r:id="rId21"/>
+    <p:sldId id="276" r:id="rId22"/>
+    <p:sldId id="277" r:id="rId23"/>
+    <p:sldId id="278" r:id="rId24"/>
+    <p:sldId id="279" r:id="rId25"/>
+    <p:sldId id="280" r:id="rId26"/>
+    <p:sldId id="281" r:id="rId27"/>
+    <p:sldId id="282" r:id="rId28"/>
+    <p:sldId id="283" r:id="rId29"/>
+    <p:sldId id="284" r:id="rId30"/>
   </p:sldIdLst>
   <p:sldSz cx="12192000" cy="6858000"/>
   <p:notesSz cx="6858000" cy="9144000"/>
@@ -276,7 +287,7 @@
           <a:p>
             <a:fld id="{14B552C3-FA97-F042-B62C-712DBB9FA0F1}" type="datetimeFigureOut">
               <a:rPr lang="en-US" smtClean="0"/>
-              <a:t>11/15/23</a:t>
+              <a:t>11/27/23</a:t>
             </a:fld>
             <a:endParaRPr lang="en-US"/>
           </a:p>
@@ -474,7 +485,7 @@
           <a:p>
             <a:fld id="{14B552C3-FA97-F042-B62C-712DBB9FA0F1}" type="datetimeFigureOut">
               <a:rPr lang="en-US" smtClean="0"/>
-              <a:t>11/15/23</a:t>
+              <a:t>11/27/23</a:t>
             </a:fld>
             <a:endParaRPr lang="en-US"/>
           </a:p>
@@ -682,7 +693,7 @@
           <a:p>
             <a:fld id="{14B552C3-FA97-F042-B62C-712DBB9FA0F1}" type="datetimeFigureOut">
               <a:rPr lang="en-US" smtClean="0"/>
-              <a:t>11/15/23</a:t>
+              <a:t>11/27/23</a:t>
             </a:fld>
             <a:endParaRPr lang="en-US"/>
           </a:p>
@@ -880,7 +891,7 @@
           <a:p>
             <a:fld id="{14B552C3-FA97-F042-B62C-712DBB9FA0F1}" type="datetimeFigureOut">
               <a:rPr lang="en-US" smtClean="0"/>
-              <a:t>11/15/23</a:t>
+              <a:t>11/27/23</a:t>
             </a:fld>
             <a:endParaRPr lang="en-US"/>
           </a:p>
@@ -1155,7 +1166,7 @@
           <a:p>
             <a:fld id="{14B552C3-FA97-F042-B62C-712DBB9FA0F1}" type="datetimeFigureOut">
               <a:rPr lang="en-US" smtClean="0"/>
-              <a:t>11/15/23</a:t>
+              <a:t>11/27/23</a:t>
             </a:fld>
             <a:endParaRPr lang="en-US"/>
           </a:p>
@@ -1420,7 +1431,7 @@
           <a:p>
             <a:fld id="{14B552C3-FA97-F042-B62C-712DBB9FA0F1}" type="datetimeFigureOut">
               <a:rPr lang="en-US" smtClean="0"/>
-              <a:t>11/15/23</a:t>
+              <a:t>11/27/23</a:t>
             </a:fld>
             <a:endParaRPr lang="en-US"/>
           </a:p>
@@ -1832,7 +1843,7 @@
           <a:p>
             <a:fld id="{14B552C3-FA97-F042-B62C-712DBB9FA0F1}" type="datetimeFigureOut">
               <a:rPr lang="en-US" smtClean="0"/>
-              <a:t>11/15/23</a:t>
+              <a:t>11/27/23</a:t>
             </a:fld>
             <a:endParaRPr lang="en-US"/>
           </a:p>
@@ -1973,7 +1984,7 @@
           <a:p>
             <a:fld id="{14B552C3-FA97-F042-B62C-712DBB9FA0F1}" type="datetimeFigureOut">
               <a:rPr lang="en-US" smtClean="0"/>
-              <a:t>11/15/23</a:t>
+              <a:t>11/27/23</a:t>
             </a:fld>
             <a:endParaRPr lang="en-US"/>
           </a:p>
@@ -2086,7 +2097,7 @@
           <a:p>
             <a:fld id="{14B552C3-FA97-F042-B62C-712DBB9FA0F1}" type="datetimeFigureOut">
               <a:rPr lang="en-US" smtClean="0"/>
-              <a:t>11/15/23</a:t>
+              <a:t>11/27/23</a:t>
             </a:fld>
             <a:endParaRPr lang="en-US"/>
           </a:p>
@@ -2397,7 +2408,7 @@
           <a:p>
             <a:fld id="{14B552C3-FA97-F042-B62C-712DBB9FA0F1}" type="datetimeFigureOut">
               <a:rPr lang="en-US" smtClean="0"/>
-              <a:t>11/15/23</a:t>
+              <a:t>11/27/23</a:t>
             </a:fld>
             <a:endParaRPr lang="en-US"/>
           </a:p>
@@ -2685,7 +2696,7 @@
           <a:p>
             <a:fld id="{14B552C3-FA97-F042-B62C-712DBB9FA0F1}" type="datetimeFigureOut">
               <a:rPr lang="en-US" smtClean="0"/>
-              <a:t>11/15/23</a:t>
+              <a:t>11/27/23</a:t>
             </a:fld>
             <a:endParaRPr lang="en-US"/>
           </a:p>
@@ -2926,7 +2937,7 @@
           <a:p>
             <a:fld id="{14B552C3-FA97-F042-B62C-712DBB9FA0F1}" type="datetimeFigureOut">
               <a:rPr lang="en-US" smtClean="0"/>
-              <a:t>11/15/23</a:t>
+              <a:t>11/27/23</a:t>
             </a:fld>
             <a:endParaRPr lang="en-US"/>
           </a:p>
@@ -3524,21 +3535,21 @@
             <a:pPr lvl="1"/>
             <a:r>
               <a:rPr lang="en-US" dirty="0"/>
-              <a:t>The description of the ODR in the standard is very long and complicated to allow for this reality.</a:t>
+              <a:t>… but not really because: the description of the ODR in the standard is very long and complicated to allow for this reality.</a:t>
             </a:r>
           </a:p>
           <a:p>
             <a:pPr lvl="1"/>
             <a:r>
               <a:rPr lang="en-US" dirty="0"/>
-              <a:t>Basically: It’s okay if all definitions are “the same.”</a:t>
+              <a:t>Basically: It’s okay if all definitions (of classes, inline functions, and templates) are “the same.”</a:t>
             </a:r>
           </a:p>
           <a:p>
             <a:pPr lvl="1"/>
             <a:r>
               <a:rPr lang="en-US" dirty="0"/>
-              <a:t>Sounds easy, right? If they are really all in a common header file?</a:t>
+              <a:t>Sounds easy, right? If they are all in a common header file?</a:t>
             </a:r>
           </a:p>
           <a:p>
@@ -4321,7 +4332,7 @@
           <a:p>
             <a:r>
               <a:rPr lang="en-US" dirty="0"/>
-              <a:t>Consider that most of the standard library is made of templates</a:t>
+              <a:t>Consider: most of the standard library is made of templates</a:t>
             </a:r>
           </a:p>
           <a:p>
@@ -4663,7 +4674,9 @@
         </p:nvSpPr>
         <p:spPr/>
         <p:txBody>
-          <a:bodyPr/>
+          <a:bodyPr>
+            <a:normAutofit/>
+          </a:bodyPr>
           <a:lstStyle/>
           <a:p>
             <a:r>
@@ -5305,7 +5318,7 @@
           <a:p>
             <a:r>
               <a:rPr lang="en-US" dirty="0"/>
-              <a:t>In most languages modules (or packages or whatever) are also used for name space control. This is not the case in C++</a:t>
+              <a:t>In most languages, modules (or packages or whatever) are also used for name space control. This is not the case in C++</a:t>
             </a:r>
           </a:p>
           <a:p>
@@ -5516,6 +5529,175 @@
 </p:sld>
 </file>
 
+<file path=ppt/slides/slide19.xml><?xml version="1.0" encoding="utf-8"?>
+<p:sld xmlns:a="http://schemas.openxmlformats.org/drawingml/2006/main" xmlns:r="http://schemas.openxmlformats.org/officeDocument/2006/relationships" xmlns:p="http://schemas.openxmlformats.org/presentationml/2006/main">
+  <p:cSld>
+    <p:spTree>
+      <p:nvGrpSpPr>
+        <p:cNvPr id="1" name=""/>
+        <p:cNvGrpSpPr/>
+        <p:nvPr/>
+      </p:nvGrpSpPr>
+      <p:grpSpPr>
+        <a:xfrm>
+          <a:off x="0" y="0"/>
+          <a:ext cx="0" cy="0"/>
+          <a:chOff x="0" y="0"/>
+          <a:chExt cx="0" cy="0"/>
+        </a:xfrm>
+      </p:grpSpPr>
+      <p:sp>
+        <p:nvSpPr>
+          <p:cNvPr id="2" name="Title 1">
+            <a:extLst>
+              <a:ext uri="{FF2B5EF4-FFF2-40B4-BE49-F238E27FC236}">
+                <a16:creationId xmlns:a16="http://schemas.microsoft.com/office/drawing/2014/main" id="{D1EBB710-D85B-BBFB-5608-12914BA90F24}"/>
+              </a:ext>
+            </a:extLst>
+          </p:cNvPr>
+          <p:cNvSpPr>
+            <a:spLocks noGrp="1"/>
+          </p:cNvSpPr>
+          <p:nvPr>
+            <p:ph type="title"/>
+          </p:nvPr>
+        </p:nvSpPr>
+        <p:spPr/>
+        <p:txBody>
+          <a:bodyPr/>
+          <a:lstStyle/>
+          <a:p>
+            <a:r>
+              <a:rPr lang="en-US" dirty="0"/>
+              <a:t>Sounds Great. How Does It Work?</a:t>
+            </a:r>
+          </a:p>
+        </p:txBody>
+      </p:sp>
+      <p:sp>
+        <p:nvSpPr>
+          <p:cNvPr id="3" name="Content Placeholder 2">
+            <a:extLst>
+              <a:ext uri="{FF2B5EF4-FFF2-40B4-BE49-F238E27FC236}">
+                <a16:creationId xmlns:a16="http://schemas.microsoft.com/office/drawing/2014/main" id="{0208B073-1520-5AFC-7192-82468E8FDA5B}"/>
+              </a:ext>
+            </a:extLst>
+          </p:cNvPr>
+          <p:cNvSpPr>
+            <a:spLocks noGrp="1"/>
+          </p:cNvSpPr>
+          <p:nvPr>
+            <p:ph idx="1"/>
+          </p:nvPr>
+        </p:nvSpPr>
+        <p:spPr/>
+        <p:txBody>
+          <a:bodyPr/>
+          <a:lstStyle/>
+          <a:p>
+            <a:r>
+              <a:rPr lang="en-US" dirty="0"/>
+              <a:t>Instead of a traditional header file, you now write a </a:t>
+            </a:r>
+            <a:r>
+              <a:rPr lang="en-US" i="1" dirty="0"/>
+              <a:t>module interface unit</a:t>
+            </a:r>
+          </a:p>
+          <a:p>
+            <a:pPr lvl="1"/>
+            <a:r>
+              <a:rPr lang="en-US" dirty="0"/>
+              <a:t>… with a .</a:t>
+            </a:r>
+            <a:r>
+              <a:rPr lang="en-US" dirty="0" err="1"/>
+              <a:t>ixx</a:t>
+            </a:r>
+            <a:r>
+              <a:rPr lang="en-US" dirty="0"/>
+              <a:t> extension for Microsoft Visual C++</a:t>
+            </a:r>
+          </a:p>
+          <a:p>
+            <a:pPr lvl="1"/>
+            <a:r>
+              <a:rPr lang="en-US" dirty="0"/>
+              <a:t>… with a .</a:t>
+            </a:r>
+            <a:r>
+              <a:rPr lang="en-US" dirty="0" err="1"/>
+              <a:t>cppm</a:t>
+            </a:r>
+            <a:r>
+              <a:rPr lang="en-US" dirty="0"/>
+              <a:t> extension for g++ and clang.</a:t>
+            </a:r>
+          </a:p>
+          <a:p>
+            <a:r>
+              <a:rPr lang="en-US" dirty="0"/>
+              <a:t>The module interface unit contains essentially the same sort of information as a header file</a:t>
+            </a:r>
+          </a:p>
+          <a:p>
+            <a:pPr lvl="1"/>
+            <a:r>
+              <a:rPr lang="en-US" dirty="0"/>
+              <a:t>Declarations of functions and global variables</a:t>
+            </a:r>
+          </a:p>
+          <a:p>
+            <a:pPr lvl="1"/>
+            <a:r>
+              <a:rPr lang="en-US" dirty="0"/>
+              <a:t>Definitions of classes, inline functions, and templates</a:t>
+            </a:r>
+          </a:p>
+          <a:p>
+            <a:r>
+              <a:rPr lang="en-US" dirty="0"/>
+              <a:t>The module interface unit can </a:t>
+            </a:r>
+            <a:r>
+              <a:rPr lang="en-US" i="1" dirty="0"/>
+              <a:t>also</a:t>
+            </a:r>
+            <a:r>
+              <a:rPr lang="en-US" dirty="0"/>
+              <a:t> contain </a:t>
+            </a:r>
+            <a:r>
+              <a:rPr lang="en-US" u="sng" dirty="0"/>
+              <a:t>definitions</a:t>
+            </a:r>
+            <a:r>
+              <a:rPr lang="en-US" dirty="0"/>
+              <a:t> of functions!</a:t>
+            </a:r>
+          </a:p>
+          <a:p>
+            <a:pPr lvl="1"/>
+            <a:r>
+              <a:rPr lang="en-US" dirty="0"/>
+              <a:t>Does not violate the ODR because it is only compiled once</a:t>
+            </a:r>
+          </a:p>
+        </p:txBody>
+      </p:sp>
+    </p:spTree>
+    <p:extLst>
+      <p:ext uri="{BB962C8B-B14F-4D97-AF65-F5344CB8AC3E}">
+        <p14:creationId xmlns:p14="http://schemas.microsoft.com/office/powerpoint/2010/main" val="2541019031"/>
+      </p:ext>
+    </p:extLst>
+  </p:cSld>
+  <p:clrMapOvr>
+    <a:masterClrMapping/>
+  </p:clrMapOvr>
+</p:sld>
+</file>
+
 <file path=ppt/slides/slide2.xml><?xml version="1.0" encoding="utf-8"?>
 <p:sld xmlns:a="http://schemas.openxmlformats.org/drawingml/2006/main" xmlns:r="http://schemas.openxmlformats.org/officeDocument/2006/relationships" xmlns:p="http://schemas.openxmlformats.org/presentationml/2006/main">
   <p:cSld>
@@ -5591,7 +5773,7 @@
             <a:pPr lvl="1"/>
             <a:r>
               <a:rPr lang="en-US" dirty="0"/>
-              <a:t>Many people don’t worry about this (or even know about this)</a:t>
+              <a:t>Many people don’t worry about this distinction (or even know about it)</a:t>
             </a:r>
           </a:p>
           <a:p>
@@ -5649,6 +5831,13 @@
             <a:r>
               <a:rPr lang="en-US" dirty="0"/>
               <a:t>Definitions are also declarations!</a:t>
+            </a:r>
+          </a:p>
+          <a:p>
+            <a:pPr lvl="1"/>
+            <a:r>
+              <a:rPr lang="en-US" dirty="0"/>
+              <a:t>That is, the set of definitions is a subset of the set of declarations</a:t>
             </a:r>
           </a:p>
         </p:txBody>
@@ -5657,6 +5846,1771 @@
     <p:extLst>
       <p:ext uri="{BB962C8B-B14F-4D97-AF65-F5344CB8AC3E}">
         <p14:creationId xmlns:p14="http://schemas.microsoft.com/office/powerpoint/2010/main" val="29643913"/>
+      </p:ext>
+    </p:extLst>
+  </p:cSld>
+  <p:clrMapOvr>
+    <a:masterClrMapping/>
+  </p:clrMapOvr>
+</p:sld>
+</file>
+
+<file path=ppt/slides/slide20.xml><?xml version="1.0" encoding="utf-8"?>
+<p:sld xmlns:a="http://schemas.openxmlformats.org/drawingml/2006/main" xmlns:r="http://schemas.openxmlformats.org/officeDocument/2006/relationships" xmlns:p="http://schemas.openxmlformats.org/presentationml/2006/main">
+  <p:cSld>
+    <p:spTree>
+      <p:nvGrpSpPr>
+        <p:cNvPr id="1" name=""/>
+        <p:cNvGrpSpPr/>
+        <p:nvPr/>
+      </p:nvGrpSpPr>
+      <p:grpSpPr>
+        <a:xfrm>
+          <a:off x="0" y="0"/>
+          <a:ext cx="0" cy="0"/>
+          <a:chOff x="0" y="0"/>
+          <a:chExt cx="0" cy="0"/>
+        </a:xfrm>
+      </p:grpSpPr>
+      <p:sp>
+        <p:nvSpPr>
+          <p:cNvPr id="2" name="Title 1">
+            <a:extLst>
+              <a:ext uri="{FF2B5EF4-FFF2-40B4-BE49-F238E27FC236}">
+                <a16:creationId xmlns:a16="http://schemas.microsoft.com/office/drawing/2014/main" id="{32B1D81E-1323-A775-E396-361C73DDA1F4}"/>
+              </a:ext>
+            </a:extLst>
+          </p:cNvPr>
+          <p:cNvSpPr>
+            <a:spLocks noGrp="1"/>
+          </p:cNvSpPr>
+          <p:nvPr>
+            <p:ph type="title"/>
+          </p:nvPr>
+        </p:nvSpPr>
+        <p:spPr/>
+        <p:txBody>
+          <a:bodyPr/>
+          <a:lstStyle/>
+          <a:p>
+            <a:r>
+              <a:rPr lang="en-US" dirty="0"/>
+              <a:t>Mixing Specification and Implementation?</a:t>
+            </a:r>
+          </a:p>
+        </p:txBody>
+      </p:sp>
+      <p:sp>
+        <p:nvSpPr>
+          <p:cNvPr id="3" name="Content Placeholder 2">
+            <a:extLst>
+              <a:ext uri="{FF2B5EF4-FFF2-40B4-BE49-F238E27FC236}">
+                <a16:creationId xmlns:a16="http://schemas.microsoft.com/office/drawing/2014/main" id="{865D8823-1C3C-A414-1E54-A6570D5A718B}"/>
+              </a:ext>
+            </a:extLst>
+          </p:cNvPr>
+          <p:cNvSpPr>
+            <a:spLocks noGrp="1"/>
+          </p:cNvSpPr>
+          <p:nvPr>
+            <p:ph idx="1"/>
+          </p:nvPr>
+        </p:nvSpPr>
+        <p:spPr/>
+        <p:txBody>
+          <a:bodyPr/>
+          <a:lstStyle/>
+          <a:p>
+            <a:r>
+              <a:rPr lang="en-US" dirty="0"/>
+              <a:t>It is possible to put the entire contents of a module in the module interface unit, thereby mixing specification and implementation</a:t>
+            </a:r>
+          </a:p>
+          <a:p>
+            <a:pPr lvl="1"/>
+            <a:r>
+              <a:rPr lang="en-US" dirty="0"/>
+              <a:t>Like what Java does in .java files</a:t>
+            </a:r>
+          </a:p>
+          <a:p>
+            <a:pPr lvl="1"/>
+            <a:r>
+              <a:rPr lang="en-US" dirty="0"/>
+              <a:t>I am not a fan of this approach</a:t>
+            </a:r>
+          </a:p>
+          <a:p>
+            <a:r>
+              <a:rPr lang="en-US" dirty="0"/>
+              <a:t>It is also possible (better) to put the definitions of the functions in a module into a separate .</a:t>
+            </a:r>
+            <a:r>
+              <a:rPr lang="en-US" dirty="0" err="1"/>
+              <a:t>cpp</a:t>
+            </a:r>
+            <a:r>
+              <a:rPr lang="en-US" dirty="0"/>
+              <a:t> file, distinct from the module interface.</a:t>
+            </a:r>
+          </a:p>
+          <a:p>
+            <a:pPr lvl="1"/>
+            <a:r>
+              <a:rPr lang="en-US" dirty="0"/>
+              <a:t>Just as is done with the traditional .</a:t>
+            </a:r>
+            <a:r>
+              <a:rPr lang="en-US" dirty="0" err="1"/>
+              <a:t>hpp</a:t>
+            </a:r>
+            <a:r>
+              <a:rPr lang="en-US" dirty="0"/>
+              <a:t>/.</a:t>
+            </a:r>
+            <a:r>
+              <a:rPr lang="en-US" dirty="0" err="1"/>
+              <a:t>cpp</a:t>
+            </a:r>
+            <a:r>
+              <a:rPr lang="en-US" dirty="0"/>
+              <a:t> separation</a:t>
+            </a:r>
+          </a:p>
+        </p:txBody>
+      </p:sp>
+    </p:spTree>
+    <p:extLst>
+      <p:ext uri="{BB962C8B-B14F-4D97-AF65-F5344CB8AC3E}">
+        <p14:creationId xmlns:p14="http://schemas.microsoft.com/office/powerpoint/2010/main" val="4290641167"/>
+      </p:ext>
+    </p:extLst>
+  </p:cSld>
+  <p:clrMapOvr>
+    <a:masterClrMapping/>
+  </p:clrMapOvr>
+</p:sld>
+</file>
+
+<file path=ppt/slides/slide21.xml><?xml version="1.0" encoding="utf-8"?>
+<p:sld xmlns:a="http://schemas.openxmlformats.org/drawingml/2006/main" xmlns:r="http://schemas.openxmlformats.org/officeDocument/2006/relationships" xmlns:p="http://schemas.openxmlformats.org/presentationml/2006/main">
+  <p:cSld>
+    <p:spTree>
+      <p:nvGrpSpPr>
+        <p:cNvPr id="1" name=""/>
+        <p:cNvGrpSpPr/>
+        <p:nvPr/>
+      </p:nvGrpSpPr>
+      <p:grpSpPr>
+        <a:xfrm>
+          <a:off x="0" y="0"/>
+          <a:ext cx="0" cy="0"/>
+          <a:chOff x="0" y="0"/>
+          <a:chExt cx="0" cy="0"/>
+        </a:xfrm>
+      </p:grpSpPr>
+      <p:sp>
+        <p:nvSpPr>
+          <p:cNvPr id="2" name="Title 1">
+            <a:extLst>
+              <a:ext uri="{FF2B5EF4-FFF2-40B4-BE49-F238E27FC236}">
+                <a16:creationId xmlns:a16="http://schemas.microsoft.com/office/drawing/2014/main" id="{C72FE634-1A94-9ABB-B326-58B70791A10F}"/>
+              </a:ext>
+            </a:extLst>
+          </p:cNvPr>
+          <p:cNvSpPr>
+            <a:spLocks noGrp="1"/>
+          </p:cNvSpPr>
+          <p:nvPr>
+            <p:ph type="title"/>
+          </p:nvPr>
+        </p:nvSpPr>
+        <p:spPr/>
+        <p:txBody>
+          <a:bodyPr/>
+          <a:lstStyle/>
+          <a:p>
+            <a:r>
+              <a:rPr lang="en-US" dirty="0"/>
+              <a:t>Show Me Some Code</a:t>
+            </a:r>
+          </a:p>
+        </p:txBody>
+      </p:sp>
+      <p:sp>
+        <p:nvSpPr>
+          <p:cNvPr id="3" name="TextBox 2">
+            <a:extLst>
+              <a:ext uri="{FF2B5EF4-FFF2-40B4-BE49-F238E27FC236}">
+                <a16:creationId xmlns:a16="http://schemas.microsoft.com/office/drawing/2014/main" id="{C8D83BD6-6597-72A7-98CE-E8CDA931E42C}"/>
+              </a:ext>
+            </a:extLst>
+          </p:cNvPr>
+          <p:cNvSpPr txBox="1"/>
+          <p:nvPr/>
+        </p:nvSpPr>
+        <p:spPr>
+          <a:xfrm>
+            <a:off x="838200" y="1690688"/>
+            <a:ext cx="10948831" cy="3970318"/>
+          </a:xfrm>
+          <a:prstGeom prst="rect">
+            <a:avLst/>
+          </a:prstGeom>
+          <a:noFill/>
+        </p:spPr>
+        <p:txBody>
+          <a:bodyPr wrap="none" rtlCol="0">
+            <a:spAutoFit/>
+          </a:bodyPr>
+          <a:lstStyle/>
+          <a:p>
+            <a:r>
+              <a:rPr lang="en-US" dirty="0">
+                <a:latin typeface="Consolas" panose="020B0609020204030204" pitchFamily="49" charset="0"/>
+                <a:cs typeface="Consolas" panose="020B0609020204030204" pitchFamily="49" charset="0"/>
+              </a:rPr>
+              <a:t>// This is a module interface unit.</a:t>
+            </a:r>
+          </a:p>
+          <a:p>
+            <a:r>
+              <a:rPr lang="en-US" dirty="0">
+                <a:latin typeface="Consolas" panose="020B0609020204030204" pitchFamily="49" charset="0"/>
+                <a:cs typeface="Consolas" panose="020B0609020204030204" pitchFamily="49" charset="0"/>
+              </a:rPr>
+              <a:t>// You can tell because it starts with “export module …”</a:t>
+            </a:r>
+          </a:p>
+          <a:p>
+            <a:endParaRPr lang="en-US" dirty="0">
+              <a:latin typeface="Consolas" panose="020B0609020204030204" pitchFamily="49" charset="0"/>
+              <a:cs typeface="Consolas" panose="020B0609020204030204" pitchFamily="49" charset="0"/>
+            </a:endParaRPr>
+          </a:p>
+          <a:p>
+            <a:r>
+              <a:rPr lang="en-US" b="1" dirty="0">
+                <a:latin typeface="Consolas" panose="020B0609020204030204" pitchFamily="49" charset="0"/>
+                <a:cs typeface="Consolas" panose="020B0609020204030204" pitchFamily="49" charset="0"/>
+              </a:rPr>
+              <a:t>export</a:t>
+            </a:r>
+            <a:r>
+              <a:rPr lang="en-US" dirty="0">
+                <a:latin typeface="Consolas" panose="020B0609020204030204" pitchFamily="49" charset="0"/>
+                <a:cs typeface="Consolas" panose="020B0609020204030204" pitchFamily="49" charset="0"/>
+              </a:rPr>
+              <a:t> </a:t>
+            </a:r>
+            <a:r>
+              <a:rPr lang="en-US" b="1" dirty="0">
+                <a:latin typeface="Consolas" panose="020B0609020204030204" pitchFamily="49" charset="0"/>
+                <a:cs typeface="Consolas" panose="020B0609020204030204" pitchFamily="49" charset="0"/>
+              </a:rPr>
+              <a:t>module</a:t>
+            </a:r>
+            <a:r>
+              <a:rPr lang="en-US" dirty="0">
+                <a:latin typeface="Consolas" panose="020B0609020204030204" pitchFamily="49" charset="0"/>
+                <a:cs typeface="Consolas" panose="020B0609020204030204" pitchFamily="49" charset="0"/>
+              </a:rPr>
+              <a:t> </a:t>
+            </a:r>
+            <a:r>
+              <a:rPr lang="en-US" dirty="0" err="1">
+                <a:latin typeface="Consolas" panose="020B0609020204030204" pitchFamily="49" charset="0"/>
+                <a:cs typeface="Consolas" panose="020B0609020204030204" pitchFamily="49" charset="0"/>
+              </a:rPr>
+              <a:t>number_theory</a:t>
+            </a:r>
+            <a:r>
+              <a:rPr lang="en-US" dirty="0">
+                <a:latin typeface="Consolas" panose="020B0609020204030204" pitchFamily="49" charset="0"/>
+                <a:cs typeface="Consolas" panose="020B0609020204030204" pitchFamily="49" charset="0"/>
+              </a:rPr>
+              <a:t>;</a:t>
+            </a:r>
+          </a:p>
+          <a:p>
+            <a:endParaRPr lang="en-US" dirty="0">
+              <a:latin typeface="Consolas" panose="020B0609020204030204" pitchFamily="49" charset="0"/>
+              <a:cs typeface="Consolas" panose="020B0609020204030204" pitchFamily="49" charset="0"/>
+            </a:endParaRPr>
+          </a:p>
+          <a:p>
+            <a:r>
+              <a:rPr lang="en-US" dirty="0">
+                <a:latin typeface="Consolas" panose="020B0609020204030204" pitchFamily="49" charset="0"/>
+                <a:cs typeface="Consolas" panose="020B0609020204030204" pitchFamily="49" charset="0"/>
+              </a:rPr>
+              <a:t>// Declarations (or definitions) prefixed with “export” are usable outside the module</a:t>
+            </a:r>
+          </a:p>
+          <a:p>
+            <a:r>
+              <a:rPr lang="en-US" b="1" dirty="0">
+                <a:latin typeface="Consolas" panose="020B0609020204030204" pitchFamily="49" charset="0"/>
+                <a:cs typeface="Consolas" panose="020B0609020204030204" pitchFamily="49" charset="0"/>
+              </a:rPr>
+              <a:t>export</a:t>
+            </a:r>
+            <a:r>
+              <a:rPr lang="en-US" dirty="0">
+                <a:latin typeface="Consolas" panose="020B0609020204030204" pitchFamily="49" charset="0"/>
+                <a:cs typeface="Consolas" panose="020B0609020204030204" pitchFamily="49" charset="0"/>
+              </a:rPr>
+              <a:t> </a:t>
+            </a:r>
+            <a:r>
+              <a:rPr lang="en-US" b="1" dirty="0">
+                <a:latin typeface="Consolas" panose="020B0609020204030204" pitchFamily="49" charset="0"/>
+                <a:cs typeface="Consolas" panose="020B0609020204030204" pitchFamily="49" charset="0"/>
+              </a:rPr>
+              <a:t>bool</a:t>
+            </a:r>
+            <a:r>
+              <a:rPr lang="en-US" dirty="0">
+                <a:latin typeface="Consolas" panose="020B0609020204030204" pitchFamily="49" charset="0"/>
+                <a:cs typeface="Consolas" panose="020B0609020204030204" pitchFamily="49" charset="0"/>
+              </a:rPr>
+              <a:t> </a:t>
+            </a:r>
+            <a:r>
+              <a:rPr lang="en-US" dirty="0" err="1">
+                <a:latin typeface="Consolas" panose="020B0609020204030204" pitchFamily="49" charset="0"/>
+                <a:cs typeface="Consolas" panose="020B0609020204030204" pitchFamily="49" charset="0"/>
+              </a:rPr>
+              <a:t>is_prime</a:t>
+            </a:r>
+            <a:r>
+              <a:rPr lang="en-US" dirty="0">
+                <a:latin typeface="Consolas" panose="020B0609020204030204" pitchFamily="49" charset="0"/>
+                <a:cs typeface="Consolas" panose="020B0609020204030204" pitchFamily="49" charset="0"/>
+              </a:rPr>
+              <a:t>( </a:t>
+            </a:r>
+            <a:r>
+              <a:rPr lang="en-US" b="1" dirty="0">
+                <a:latin typeface="Consolas" panose="020B0609020204030204" pitchFamily="49" charset="0"/>
+                <a:cs typeface="Consolas" panose="020B0609020204030204" pitchFamily="49" charset="0"/>
+              </a:rPr>
+              <a:t>unsigned</a:t>
+            </a:r>
+            <a:r>
+              <a:rPr lang="en-US" dirty="0">
+                <a:latin typeface="Consolas" panose="020B0609020204030204" pitchFamily="49" charset="0"/>
+                <a:cs typeface="Consolas" panose="020B0609020204030204" pitchFamily="49" charset="0"/>
+              </a:rPr>
+              <a:t> n );</a:t>
+            </a:r>
+          </a:p>
+          <a:p>
+            <a:r>
+              <a:rPr lang="en-US" b="1" dirty="0">
+                <a:latin typeface="Consolas" panose="020B0609020204030204" pitchFamily="49" charset="0"/>
+                <a:cs typeface="Consolas" panose="020B0609020204030204" pitchFamily="49" charset="0"/>
+              </a:rPr>
+              <a:t>export</a:t>
+            </a:r>
+            <a:r>
+              <a:rPr lang="en-US" dirty="0">
+                <a:latin typeface="Consolas" panose="020B0609020204030204" pitchFamily="49" charset="0"/>
+                <a:cs typeface="Consolas" panose="020B0609020204030204" pitchFamily="49" charset="0"/>
+              </a:rPr>
+              <a:t> </a:t>
+            </a:r>
+            <a:r>
+              <a:rPr lang="en-US" b="1" dirty="0">
+                <a:latin typeface="Consolas" panose="020B0609020204030204" pitchFamily="49" charset="0"/>
+                <a:cs typeface="Consolas" panose="020B0609020204030204" pitchFamily="49" charset="0"/>
+              </a:rPr>
+              <a:t>class</a:t>
+            </a:r>
+            <a:r>
+              <a:rPr lang="en-US" dirty="0">
+                <a:latin typeface="Consolas" panose="020B0609020204030204" pitchFamily="49" charset="0"/>
+                <a:cs typeface="Consolas" panose="020B0609020204030204" pitchFamily="49" charset="0"/>
+              </a:rPr>
+              <a:t> </a:t>
+            </a:r>
+            <a:r>
+              <a:rPr lang="en-US" dirty="0" err="1">
+                <a:latin typeface="Consolas" panose="020B0609020204030204" pitchFamily="49" charset="0"/>
+                <a:cs typeface="Consolas" panose="020B0609020204030204" pitchFamily="49" charset="0"/>
+              </a:rPr>
+              <a:t>RandomGenerator</a:t>
+            </a:r>
+            <a:r>
+              <a:rPr lang="en-US" dirty="0">
+                <a:latin typeface="Consolas" panose="020B0609020204030204" pitchFamily="49" charset="0"/>
+                <a:cs typeface="Consolas" panose="020B0609020204030204" pitchFamily="49" charset="0"/>
+              </a:rPr>
+              <a:t> { … };</a:t>
+            </a:r>
+          </a:p>
+          <a:p>
+            <a:r>
+              <a:rPr lang="en-US" b="1" dirty="0">
+                <a:latin typeface="Consolas" panose="020B0609020204030204" pitchFamily="49" charset="0"/>
+                <a:cs typeface="Consolas" panose="020B0609020204030204" pitchFamily="49" charset="0"/>
+              </a:rPr>
+              <a:t>export</a:t>
+            </a:r>
+            <a:r>
+              <a:rPr lang="en-US" dirty="0">
+                <a:latin typeface="Consolas" panose="020B0609020204030204" pitchFamily="49" charset="0"/>
+                <a:cs typeface="Consolas" panose="020B0609020204030204" pitchFamily="49" charset="0"/>
+              </a:rPr>
+              <a:t> </a:t>
+            </a:r>
+            <a:r>
+              <a:rPr lang="en-US" b="1" dirty="0">
+                <a:latin typeface="Consolas" panose="020B0609020204030204" pitchFamily="49" charset="0"/>
+                <a:cs typeface="Consolas" panose="020B0609020204030204" pitchFamily="49" charset="0"/>
+              </a:rPr>
+              <a:t>inline</a:t>
+            </a:r>
+            <a:r>
+              <a:rPr lang="en-US" dirty="0">
+                <a:latin typeface="Consolas" panose="020B0609020204030204" pitchFamily="49" charset="0"/>
+                <a:cs typeface="Consolas" panose="020B0609020204030204" pitchFamily="49" charset="0"/>
+              </a:rPr>
+              <a:t> </a:t>
+            </a:r>
+            <a:r>
+              <a:rPr lang="en-US" b="1" dirty="0">
+                <a:latin typeface="Consolas" panose="020B0609020204030204" pitchFamily="49" charset="0"/>
+                <a:cs typeface="Consolas" panose="020B0609020204030204" pitchFamily="49" charset="0"/>
+              </a:rPr>
+              <a:t>bool</a:t>
+            </a:r>
+            <a:r>
+              <a:rPr lang="en-US" dirty="0">
+                <a:latin typeface="Consolas" panose="020B0609020204030204" pitchFamily="49" charset="0"/>
+                <a:cs typeface="Consolas" panose="020B0609020204030204" pitchFamily="49" charset="0"/>
+              </a:rPr>
+              <a:t> </a:t>
+            </a:r>
+            <a:r>
+              <a:rPr lang="en-US" dirty="0" err="1">
+                <a:latin typeface="Consolas" panose="020B0609020204030204" pitchFamily="49" charset="0"/>
+                <a:cs typeface="Consolas" panose="020B0609020204030204" pitchFamily="49" charset="0"/>
+              </a:rPr>
+              <a:t>is_even</a:t>
+            </a:r>
+            <a:r>
+              <a:rPr lang="en-US" dirty="0">
+                <a:latin typeface="Consolas" panose="020B0609020204030204" pitchFamily="49" charset="0"/>
+                <a:cs typeface="Consolas" panose="020B0609020204030204" pitchFamily="49" charset="0"/>
+              </a:rPr>
+              <a:t>( </a:t>
+            </a:r>
+            <a:r>
+              <a:rPr lang="en-US" b="1" dirty="0">
+                <a:latin typeface="Consolas" panose="020B0609020204030204" pitchFamily="49" charset="0"/>
+                <a:cs typeface="Consolas" panose="020B0609020204030204" pitchFamily="49" charset="0"/>
+              </a:rPr>
+              <a:t>unsigned</a:t>
+            </a:r>
+            <a:r>
+              <a:rPr lang="en-US" dirty="0">
+                <a:latin typeface="Consolas" panose="020B0609020204030204" pitchFamily="49" charset="0"/>
+                <a:cs typeface="Consolas" panose="020B0609020204030204" pitchFamily="49" charset="0"/>
+              </a:rPr>
+              <a:t> n ) { </a:t>
+            </a:r>
+            <a:r>
+              <a:rPr lang="en-US" b="1" dirty="0">
+                <a:latin typeface="Consolas" panose="020B0609020204030204" pitchFamily="49" charset="0"/>
+                <a:cs typeface="Consolas" panose="020B0609020204030204" pitchFamily="49" charset="0"/>
+              </a:rPr>
+              <a:t>return</a:t>
+            </a:r>
+            <a:r>
+              <a:rPr lang="en-US" dirty="0">
+                <a:latin typeface="Consolas" panose="020B0609020204030204" pitchFamily="49" charset="0"/>
+                <a:cs typeface="Consolas" panose="020B0609020204030204" pitchFamily="49" charset="0"/>
+              </a:rPr>
+              <a:t> n % 2 == 0; }</a:t>
+            </a:r>
+          </a:p>
+          <a:p>
+            <a:endParaRPr lang="en-US" dirty="0">
+              <a:latin typeface="Consolas" panose="020B0609020204030204" pitchFamily="49" charset="0"/>
+              <a:cs typeface="Consolas" panose="020B0609020204030204" pitchFamily="49" charset="0"/>
+            </a:endParaRPr>
+          </a:p>
+          <a:p>
+            <a:r>
+              <a:rPr lang="en-US" dirty="0">
+                <a:latin typeface="Consolas" panose="020B0609020204030204" pitchFamily="49" charset="0"/>
+                <a:cs typeface="Consolas" panose="020B0609020204030204" pitchFamily="49" charset="0"/>
+              </a:rPr>
+              <a:t>// Declarations without “export” are for internal module use only.</a:t>
+            </a:r>
+          </a:p>
+          <a:p>
+            <a:r>
+              <a:rPr lang="en-US" b="1" dirty="0">
+                <a:latin typeface="Consolas" panose="020B0609020204030204" pitchFamily="49" charset="0"/>
+                <a:cs typeface="Consolas" panose="020B0609020204030204" pitchFamily="49" charset="0"/>
+              </a:rPr>
+              <a:t>unsigned</a:t>
+            </a:r>
+            <a:r>
+              <a:rPr lang="en-US" dirty="0">
+                <a:latin typeface="Consolas" panose="020B0609020204030204" pitchFamily="49" charset="0"/>
+                <a:cs typeface="Consolas" panose="020B0609020204030204" pitchFamily="49" charset="0"/>
+              </a:rPr>
+              <a:t> </a:t>
+            </a:r>
+            <a:r>
+              <a:rPr lang="en-US" dirty="0" err="1">
+                <a:latin typeface="Consolas" panose="020B0609020204030204" pitchFamily="49" charset="0"/>
+                <a:cs typeface="Consolas" panose="020B0609020204030204" pitchFamily="49" charset="0"/>
+              </a:rPr>
+              <a:t>gcd</a:t>
+            </a:r>
+            <a:r>
+              <a:rPr lang="en-US" dirty="0">
+                <a:latin typeface="Consolas" panose="020B0609020204030204" pitchFamily="49" charset="0"/>
+                <a:cs typeface="Consolas" panose="020B0609020204030204" pitchFamily="49" charset="0"/>
+              </a:rPr>
+              <a:t>( </a:t>
+            </a:r>
+            <a:r>
+              <a:rPr lang="en-US" b="1" dirty="0">
+                <a:latin typeface="Consolas" panose="020B0609020204030204" pitchFamily="49" charset="0"/>
+                <a:cs typeface="Consolas" panose="020B0609020204030204" pitchFamily="49" charset="0"/>
+              </a:rPr>
+              <a:t>unsigned</a:t>
+            </a:r>
+            <a:r>
+              <a:rPr lang="en-US" dirty="0">
+                <a:latin typeface="Consolas" panose="020B0609020204030204" pitchFamily="49" charset="0"/>
+                <a:cs typeface="Consolas" panose="020B0609020204030204" pitchFamily="49" charset="0"/>
+              </a:rPr>
+              <a:t> a, </a:t>
+            </a:r>
+            <a:r>
+              <a:rPr lang="en-US" b="1" dirty="0">
+                <a:latin typeface="Consolas" panose="020B0609020204030204" pitchFamily="49" charset="0"/>
+                <a:cs typeface="Consolas" panose="020B0609020204030204" pitchFamily="49" charset="0"/>
+              </a:rPr>
+              <a:t>unsigned</a:t>
+            </a:r>
+            <a:r>
+              <a:rPr lang="en-US" dirty="0">
+                <a:latin typeface="Consolas" panose="020B0609020204030204" pitchFamily="49" charset="0"/>
+                <a:cs typeface="Consolas" panose="020B0609020204030204" pitchFamily="49" charset="0"/>
+              </a:rPr>
+              <a:t> b );</a:t>
+            </a:r>
+          </a:p>
+          <a:p>
+            <a:endParaRPr lang="en-US" dirty="0">
+              <a:latin typeface="Consolas" panose="020B0609020204030204" pitchFamily="49" charset="0"/>
+              <a:cs typeface="Consolas" panose="020B0609020204030204" pitchFamily="49" charset="0"/>
+            </a:endParaRPr>
+          </a:p>
+          <a:p>
+            <a:endParaRPr lang="en-US" dirty="0"/>
+          </a:p>
+        </p:txBody>
+      </p:sp>
+    </p:spTree>
+    <p:extLst>
+      <p:ext uri="{BB962C8B-B14F-4D97-AF65-F5344CB8AC3E}">
+        <p14:creationId xmlns:p14="http://schemas.microsoft.com/office/powerpoint/2010/main" val="2261281105"/>
+      </p:ext>
+    </p:extLst>
+  </p:cSld>
+  <p:clrMapOvr>
+    <a:masterClrMapping/>
+  </p:clrMapOvr>
+</p:sld>
+</file>
+
+<file path=ppt/slides/slide22.xml><?xml version="1.0" encoding="utf-8"?>
+<p:sld xmlns:a="http://schemas.openxmlformats.org/drawingml/2006/main" xmlns:r="http://schemas.openxmlformats.org/officeDocument/2006/relationships" xmlns:p="http://schemas.openxmlformats.org/presentationml/2006/main">
+  <p:cSld>
+    <p:spTree>
+      <p:nvGrpSpPr>
+        <p:cNvPr id="1" name=""/>
+        <p:cNvGrpSpPr/>
+        <p:nvPr/>
+      </p:nvGrpSpPr>
+      <p:grpSpPr>
+        <a:xfrm>
+          <a:off x="0" y="0"/>
+          <a:ext cx="0" cy="0"/>
+          <a:chOff x="0" y="0"/>
+          <a:chExt cx="0" cy="0"/>
+        </a:xfrm>
+      </p:grpSpPr>
+      <p:sp>
+        <p:nvSpPr>
+          <p:cNvPr id="2" name="Title 1">
+            <a:extLst>
+              <a:ext uri="{FF2B5EF4-FFF2-40B4-BE49-F238E27FC236}">
+                <a16:creationId xmlns:a16="http://schemas.microsoft.com/office/drawing/2014/main" id="{E2B7EF9C-5083-2616-FDB5-40FFD7DAE443}"/>
+              </a:ext>
+            </a:extLst>
+          </p:cNvPr>
+          <p:cNvSpPr>
+            <a:spLocks noGrp="1"/>
+          </p:cNvSpPr>
+          <p:nvPr>
+            <p:ph type="title"/>
+          </p:nvPr>
+        </p:nvSpPr>
+        <p:spPr/>
+        <p:txBody>
+          <a:bodyPr/>
+          <a:lstStyle/>
+          <a:p>
+            <a:r>
+              <a:rPr lang="en-US" dirty="0"/>
+              <a:t>What Next?</a:t>
+            </a:r>
+          </a:p>
+        </p:txBody>
+      </p:sp>
+      <p:sp>
+        <p:nvSpPr>
+          <p:cNvPr id="3" name="Content Placeholder 2">
+            <a:extLst>
+              <a:ext uri="{FF2B5EF4-FFF2-40B4-BE49-F238E27FC236}">
+                <a16:creationId xmlns:a16="http://schemas.microsoft.com/office/drawing/2014/main" id="{7D573909-0F8D-9DD9-CB44-FA21533EE4C9}"/>
+              </a:ext>
+            </a:extLst>
+          </p:cNvPr>
+          <p:cNvSpPr>
+            <a:spLocks noGrp="1"/>
+          </p:cNvSpPr>
+          <p:nvPr>
+            <p:ph idx="1"/>
+          </p:nvPr>
+        </p:nvSpPr>
+        <p:spPr/>
+        <p:txBody>
+          <a:bodyPr/>
+          <a:lstStyle/>
+          <a:p>
+            <a:r>
+              <a:rPr lang="en-US" dirty="0"/>
+              <a:t>The module interface unit is compiled separately (and just once) to create the </a:t>
+            </a:r>
+            <a:r>
+              <a:rPr lang="en-US" i="1" dirty="0"/>
+              <a:t>built module interface</a:t>
+            </a:r>
+            <a:r>
+              <a:rPr lang="en-US" dirty="0"/>
+              <a:t> (BMI) file</a:t>
+            </a:r>
+          </a:p>
+          <a:p>
+            <a:r>
+              <a:rPr lang="en-US" dirty="0"/>
+              <a:t>The format of the BMI file is compiler-specific and not portable or standardized. It is like the object files normally produced</a:t>
+            </a:r>
+          </a:p>
+          <a:p>
+            <a:r>
+              <a:rPr lang="en-US" dirty="0"/>
+              <a:t>The BMI file contains the parsed and analyzed result of processing the module interface unit in a form that is easy for the compiler to ingest</a:t>
+            </a:r>
+          </a:p>
+        </p:txBody>
+      </p:sp>
+    </p:spTree>
+    <p:extLst>
+      <p:ext uri="{BB962C8B-B14F-4D97-AF65-F5344CB8AC3E}">
+        <p14:creationId xmlns:p14="http://schemas.microsoft.com/office/powerpoint/2010/main" val="3501449687"/>
+      </p:ext>
+    </p:extLst>
+  </p:cSld>
+  <p:clrMapOvr>
+    <a:masterClrMapping/>
+  </p:clrMapOvr>
+</p:sld>
+</file>
+
+<file path=ppt/slides/slide23.xml><?xml version="1.0" encoding="utf-8"?>
+<p:sld xmlns:a="http://schemas.openxmlformats.org/drawingml/2006/main" xmlns:r="http://schemas.openxmlformats.org/officeDocument/2006/relationships" xmlns:p="http://schemas.openxmlformats.org/presentationml/2006/main">
+  <p:cSld>
+    <p:spTree>
+      <p:nvGrpSpPr>
+        <p:cNvPr id="1" name=""/>
+        <p:cNvGrpSpPr/>
+        <p:nvPr/>
+      </p:nvGrpSpPr>
+      <p:grpSpPr>
+        <a:xfrm>
+          <a:off x="0" y="0"/>
+          <a:ext cx="0" cy="0"/>
+          <a:chOff x="0" y="0"/>
+          <a:chExt cx="0" cy="0"/>
+        </a:xfrm>
+      </p:grpSpPr>
+      <p:sp>
+        <p:nvSpPr>
+          <p:cNvPr id="2" name="Title 1">
+            <a:extLst>
+              <a:ext uri="{FF2B5EF4-FFF2-40B4-BE49-F238E27FC236}">
+                <a16:creationId xmlns:a16="http://schemas.microsoft.com/office/drawing/2014/main" id="{AE63FC27-4D86-DEC9-4048-A94EA81A5D77}"/>
+              </a:ext>
+            </a:extLst>
+          </p:cNvPr>
+          <p:cNvSpPr>
+            <a:spLocks noGrp="1"/>
+          </p:cNvSpPr>
+          <p:nvPr>
+            <p:ph type="title"/>
+          </p:nvPr>
+        </p:nvSpPr>
+        <p:spPr/>
+        <p:txBody>
+          <a:bodyPr/>
+          <a:lstStyle/>
+          <a:p>
+            <a:r>
+              <a:rPr lang="en-US" dirty="0"/>
+              <a:t>Client Code?</a:t>
+            </a:r>
+          </a:p>
+        </p:txBody>
+      </p:sp>
+      <p:sp>
+        <p:nvSpPr>
+          <p:cNvPr id="3" name="Content Placeholder 2">
+            <a:extLst>
+              <a:ext uri="{FF2B5EF4-FFF2-40B4-BE49-F238E27FC236}">
+                <a16:creationId xmlns:a16="http://schemas.microsoft.com/office/drawing/2014/main" id="{C2A5CF08-20C5-AE20-A0ED-21DFE1CD967D}"/>
+              </a:ext>
+            </a:extLst>
+          </p:cNvPr>
+          <p:cNvSpPr>
+            <a:spLocks noGrp="1"/>
+          </p:cNvSpPr>
+          <p:nvPr>
+            <p:ph idx="1"/>
+          </p:nvPr>
+        </p:nvSpPr>
+        <p:spPr/>
+        <p:txBody>
+          <a:bodyPr/>
+          <a:lstStyle/>
+          <a:p>
+            <a:r>
+              <a:rPr lang="en-US" dirty="0"/>
+              <a:t>To use a module, import it:</a:t>
+            </a:r>
+            <a:br>
+              <a:rPr lang="en-US" dirty="0"/>
+            </a:br>
+            <a:br>
+              <a:rPr lang="en-US" dirty="0"/>
+            </a:br>
+            <a:endParaRPr lang="en-US" dirty="0"/>
+          </a:p>
+          <a:p>
+            <a:r>
+              <a:rPr lang="en-US" dirty="0"/>
+              <a:t>All exported declarations are visible in the client program, much like including a header file. Except…</a:t>
+            </a:r>
+          </a:p>
+          <a:p>
+            <a:pPr lvl="1"/>
+            <a:r>
+              <a:rPr lang="en-US" dirty="0"/>
+              <a:t>… preprocessing done in the module interface unit has no impact on the client code</a:t>
+            </a:r>
+          </a:p>
+          <a:p>
+            <a:pPr lvl="1"/>
+            <a:r>
+              <a:rPr lang="en-US" dirty="0"/>
+              <a:t>… any imports in the module interface unit have no impact on the client code (the client must explicitly import all modules that are directly needed)</a:t>
+            </a:r>
+          </a:p>
+          <a:p>
+            <a:r>
+              <a:rPr lang="en-US" dirty="0"/>
+              <a:t>Imports can be reordered with no semantic effect</a:t>
+            </a:r>
+          </a:p>
+        </p:txBody>
+      </p:sp>
+      <p:sp>
+        <p:nvSpPr>
+          <p:cNvPr id="4" name="TextBox 3">
+            <a:extLst>
+              <a:ext uri="{FF2B5EF4-FFF2-40B4-BE49-F238E27FC236}">
+                <a16:creationId xmlns:a16="http://schemas.microsoft.com/office/drawing/2014/main" id="{7F07EC85-296B-11DE-0195-22A82753745D}"/>
+              </a:ext>
+            </a:extLst>
+          </p:cNvPr>
+          <p:cNvSpPr txBox="1"/>
+          <p:nvPr/>
+        </p:nvSpPr>
+        <p:spPr>
+          <a:xfrm>
+            <a:off x="1121228" y="2481943"/>
+            <a:ext cx="2844048" cy="369332"/>
+          </a:xfrm>
+          <a:prstGeom prst="rect">
+            <a:avLst/>
+          </a:prstGeom>
+          <a:noFill/>
+        </p:spPr>
+        <p:txBody>
+          <a:bodyPr wrap="none" rtlCol="0">
+            <a:spAutoFit/>
+          </a:bodyPr>
+          <a:lstStyle/>
+          <a:p>
+            <a:r>
+              <a:rPr lang="en-US" b="1" dirty="0">
+                <a:latin typeface="Consolas" panose="020B0609020204030204" pitchFamily="49" charset="0"/>
+                <a:cs typeface="Consolas" panose="020B0609020204030204" pitchFamily="49" charset="0"/>
+              </a:rPr>
+              <a:t>import</a:t>
+            </a:r>
+            <a:r>
+              <a:rPr lang="en-US" dirty="0">
+                <a:latin typeface="Consolas" panose="020B0609020204030204" pitchFamily="49" charset="0"/>
+                <a:cs typeface="Consolas" panose="020B0609020204030204" pitchFamily="49" charset="0"/>
+              </a:rPr>
+              <a:t> </a:t>
+            </a:r>
+            <a:r>
+              <a:rPr lang="en-US" dirty="0" err="1">
+                <a:latin typeface="Consolas" panose="020B0609020204030204" pitchFamily="49" charset="0"/>
+                <a:cs typeface="Consolas" panose="020B0609020204030204" pitchFamily="49" charset="0"/>
+              </a:rPr>
+              <a:t>number_theory</a:t>
+            </a:r>
+            <a:r>
+              <a:rPr lang="en-US" dirty="0">
+                <a:latin typeface="Consolas" panose="020B0609020204030204" pitchFamily="49" charset="0"/>
+                <a:cs typeface="Consolas" panose="020B0609020204030204" pitchFamily="49" charset="0"/>
+              </a:rPr>
+              <a:t>;</a:t>
+            </a:r>
+          </a:p>
+        </p:txBody>
+      </p:sp>
+    </p:spTree>
+    <p:extLst>
+      <p:ext uri="{BB962C8B-B14F-4D97-AF65-F5344CB8AC3E}">
+        <p14:creationId xmlns:p14="http://schemas.microsoft.com/office/powerpoint/2010/main" val="1314827381"/>
+      </p:ext>
+    </p:extLst>
+  </p:cSld>
+  <p:clrMapOvr>
+    <a:masterClrMapping/>
+  </p:clrMapOvr>
+</p:sld>
+</file>
+
+<file path=ppt/slides/slide24.xml><?xml version="1.0" encoding="utf-8"?>
+<p:sld xmlns:a="http://schemas.openxmlformats.org/drawingml/2006/main" xmlns:r="http://schemas.openxmlformats.org/officeDocument/2006/relationships" xmlns:p="http://schemas.openxmlformats.org/presentationml/2006/main">
+  <p:cSld>
+    <p:spTree>
+      <p:nvGrpSpPr>
+        <p:cNvPr id="1" name=""/>
+        <p:cNvGrpSpPr/>
+        <p:nvPr/>
+      </p:nvGrpSpPr>
+      <p:grpSpPr>
+        <a:xfrm>
+          <a:off x="0" y="0"/>
+          <a:ext cx="0" cy="0"/>
+          <a:chOff x="0" y="0"/>
+          <a:chExt cx="0" cy="0"/>
+        </a:xfrm>
+      </p:grpSpPr>
+      <p:sp>
+        <p:nvSpPr>
+          <p:cNvPr id="2" name="Title 1">
+            <a:extLst>
+              <a:ext uri="{FF2B5EF4-FFF2-40B4-BE49-F238E27FC236}">
+                <a16:creationId xmlns:a16="http://schemas.microsoft.com/office/drawing/2014/main" id="{16C92155-4E5C-4673-768B-A7AE24823245}"/>
+              </a:ext>
+            </a:extLst>
+          </p:cNvPr>
+          <p:cNvSpPr>
+            <a:spLocks noGrp="1"/>
+          </p:cNvSpPr>
+          <p:nvPr>
+            <p:ph type="title"/>
+          </p:nvPr>
+        </p:nvSpPr>
+        <p:spPr/>
+        <p:txBody>
+          <a:bodyPr/>
+          <a:lstStyle/>
+          <a:p>
+            <a:r>
+              <a:rPr lang="en-US" dirty="0"/>
+              <a:t>What About Large Modules?</a:t>
+            </a:r>
+          </a:p>
+        </p:txBody>
+      </p:sp>
+      <p:sp>
+        <p:nvSpPr>
+          <p:cNvPr id="3" name="Content Placeholder 2">
+            <a:extLst>
+              <a:ext uri="{FF2B5EF4-FFF2-40B4-BE49-F238E27FC236}">
+                <a16:creationId xmlns:a16="http://schemas.microsoft.com/office/drawing/2014/main" id="{CCA099D4-97C2-32BF-0F6A-247B70BBFE39}"/>
+              </a:ext>
+            </a:extLst>
+          </p:cNvPr>
+          <p:cNvSpPr>
+            <a:spLocks noGrp="1"/>
+          </p:cNvSpPr>
+          <p:nvPr>
+            <p:ph idx="1"/>
+          </p:nvPr>
+        </p:nvSpPr>
+        <p:spPr/>
+        <p:txBody>
+          <a:bodyPr/>
+          <a:lstStyle/>
+          <a:p>
+            <a:r>
+              <a:rPr lang="en-US" dirty="0"/>
+              <a:t>A single module interface unit is a problem for very large modules</a:t>
+            </a:r>
+          </a:p>
+          <a:p>
+            <a:pPr lvl="1"/>
+            <a:r>
+              <a:rPr lang="en-US" dirty="0"/>
+              <a:t>… like the module </a:t>
+            </a:r>
+            <a:r>
+              <a:rPr lang="en-US" dirty="0">
+                <a:latin typeface="Consolas" panose="020B0609020204030204" pitchFamily="49" charset="0"/>
+                <a:cs typeface="Consolas" panose="020B0609020204030204" pitchFamily="49" charset="0"/>
+              </a:rPr>
+              <a:t>std</a:t>
+            </a:r>
+            <a:r>
+              <a:rPr lang="en-US" dirty="0"/>
+              <a:t> defined by C++ 2023</a:t>
+            </a:r>
+          </a:p>
+          <a:p>
+            <a:r>
+              <a:rPr lang="en-US" dirty="0"/>
+              <a:t>C++ 2020 modules can be </a:t>
+            </a:r>
+            <a:r>
+              <a:rPr lang="en-US" i="1" dirty="0"/>
+              <a:t>partitioned</a:t>
+            </a:r>
+          </a:p>
+          <a:p>
+            <a:pPr lvl="1"/>
+            <a:r>
+              <a:rPr lang="en-US" dirty="0"/>
+              <a:t>The top-level module interface file mentions the partitions</a:t>
+            </a:r>
+          </a:p>
+          <a:p>
+            <a:pPr lvl="1"/>
+            <a:r>
+              <a:rPr lang="en-US" dirty="0"/>
+              <a:t>Separate files hold the declarations for the various partitions</a:t>
+            </a:r>
+          </a:p>
+          <a:p>
+            <a:r>
+              <a:rPr lang="en-US" dirty="0"/>
+              <a:t>There is no semantic significance of the partitions</a:t>
+            </a:r>
+          </a:p>
+          <a:p>
+            <a:pPr lvl="1"/>
+            <a:r>
+              <a:rPr lang="en-US" dirty="0"/>
+              <a:t>It’s still one module</a:t>
+            </a:r>
+          </a:p>
+          <a:p>
+            <a:pPr lvl="1"/>
+            <a:r>
+              <a:rPr lang="en-US" dirty="0"/>
+              <a:t>The partitions are only to make management of large modules easier</a:t>
+            </a:r>
+          </a:p>
+          <a:p>
+            <a:pPr lvl="1"/>
+            <a:r>
+              <a:rPr lang="en-US" u="sng" dirty="0"/>
+              <a:t>Don’t forget that you can use name spaces to organize a large module’s code base!</a:t>
+            </a:r>
+          </a:p>
+          <a:p>
+            <a:pPr lvl="1"/>
+            <a:endParaRPr lang="en-US" dirty="0"/>
+          </a:p>
+        </p:txBody>
+      </p:sp>
+    </p:spTree>
+    <p:extLst>
+      <p:ext uri="{BB962C8B-B14F-4D97-AF65-F5344CB8AC3E}">
+        <p14:creationId xmlns:p14="http://schemas.microsoft.com/office/powerpoint/2010/main" val="1642997821"/>
+      </p:ext>
+    </p:extLst>
+  </p:cSld>
+  <p:clrMapOvr>
+    <a:masterClrMapping/>
+  </p:clrMapOvr>
+</p:sld>
+</file>
+
+<file path=ppt/slides/slide25.xml><?xml version="1.0" encoding="utf-8"?>
+<p:sld xmlns:a="http://schemas.openxmlformats.org/drawingml/2006/main" xmlns:r="http://schemas.openxmlformats.org/officeDocument/2006/relationships" xmlns:p="http://schemas.openxmlformats.org/presentationml/2006/main">
+  <p:cSld>
+    <p:spTree>
+      <p:nvGrpSpPr>
+        <p:cNvPr id="1" name=""/>
+        <p:cNvGrpSpPr/>
+        <p:nvPr/>
+      </p:nvGrpSpPr>
+      <p:grpSpPr>
+        <a:xfrm>
+          <a:off x="0" y="0"/>
+          <a:ext cx="0" cy="0"/>
+          <a:chOff x="0" y="0"/>
+          <a:chExt cx="0" cy="0"/>
+        </a:xfrm>
+      </p:grpSpPr>
+      <p:sp>
+        <p:nvSpPr>
+          <p:cNvPr id="2" name="Title 1">
+            <a:extLst>
+              <a:ext uri="{FF2B5EF4-FFF2-40B4-BE49-F238E27FC236}">
+                <a16:creationId xmlns:a16="http://schemas.microsoft.com/office/drawing/2014/main" id="{B5A18C68-73E1-2114-EA76-F3E0D5800077}"/>
+              </a:ext>
+            </a:extLst>
+          </p:cNvPr>
+          <p:cNvSpPr>
+            <a:spLocks noGrp="1"/>
+          </p:cNvSpPr>
+          <p:nvPr>
+            <p:ph type="title"/>
+          </p:nvPr>
+        </p:nvSpPr>
+        <p:spPr/>
+        <p:txBody>
+          <a:bodyPr/>
+          <a:lstStyle/>
+          <a:p>
+            <a:r>
+              <a:rPr lang="en-US" dirty="0"/>
+              <a:t>Module Implementation?</a:t>
+            </a:r>
+          </a:p>
+        </p:txBody>
+      </p:sp>
+      <p:sp>
+        <p:nvSpPr>
+          <p:cNvPr id="3" name="Content Placeholder 2">
+            <a:extLst>
+              <a:ext uri="{FF2B5EF4-FFF2-40B4-BE49-F238E27FC236}">
+                <a16:creationId xmlns:a16="http://schemas.microsoft.com/office/drawing/2014/main" id="{32F456B8-1847-6B0C-4DED-E02C3D747EFD}"/>
+              </a:ext>
+            </a:extLst>
+          </p:cNvPr>
+          <p:cNvSpPr>
+            <a:spLocks noGrp="1"/>
+          </p:cNvSpPr>
+          <p:nvPr>
+            <p:ph idx="1"/>
+          </p:nvPr>
+        </p:nvSpPr>
+        <p:spPr/>
+        <p:txBody>
+          <a:bodyPr/>
+          <a:lstStyle/>
+          <a:p>
+            <a:r>
+              <a:rPr lang="en-US" dirty="0"/>
+              <a:t>In the common case where the definitions of the functions in a module are not in the module interface unit…</a:t>
+            </a:r>
+          </a:p>
+          <a:p>
+            <a:r>
+              <a:rPr lang="en-US" dirty="0"/>
+              <a:t>… you can create one or more .</a:t>
+            </a:r>
+            <a:r>
+              <a:rPr lang="en-US" dirty="0" err="1"/>
+              <a:t>cpp</a:t>
+            </a:r>
+            <a:r>
+              <a:rPr lang="en-US" dirty="0"/>
+              <a:t> files with those definitions. Start with a module declaration:</a:t>
+            </a:r>
+            <a:br>
+              <a:rPr lang="en-US" dirty="0"/>
+            </a:br>
+            <a:br>
+              <a:rPr lang="en-US" dirty="0"/>
+            </a:br>
+            <a:endParaRPr lang="en-US" dirty="0"/>
+          </a:p>
+          <a:p>
+            <a:r>
+              <a:rPr lang="en-US" dirty="0"/>
+              <a:t>Without the </a:t>
+            </a:r>
+            <a:r>
+              <a:rPr lang="en-US" b="1" dirty="0">
+                <a:latin typeface="Consolas" panose="020B0609020204030204" pitchFamily="49" charset="0"/>
+                <a:cs typeface="Consolas" panose="020B0609020204030204" pitchFamily="49" charset="0"/>
+              </a:rPr>
+              <a:t>export</a:t>
+            </a:r>
+            <a:r>
+              <a:rPr lang="en-US" dirty="0"/>
+              <a:t> keyword, this says the file is part of the named module’s implementation</a:t>
+            </a:r>
+          </a:p>
+        </p:txBody>
+      </p:sp>
+      <p:sp>
+        <p:nvSpPr>
+          <p:cNvPr id="4" name="TextBox 3">
+            <a:extLst>
+              <a:ext uri="{FF2B5EF4-FFF2-40B4-BE49-F238E27FC236}">
+                <a16:creationId xmlns:a16="http://schemas.microsoft.com/office/drawing/2014/main" id="{346F416E-9FEB-1063-FFBF-0B4274F0FD45}"/>
+              </a:ext>
+            </a:extLst>
+          </p:cNvPr>
+          <p:cNvSpPr txBox="1"/>
+          <p:nvPr/>
+        </p:nvSpPr>
+        <p:spPr>
+          <a:xfrm>
+            <a:off x="1099458" y="3816628"/>
+            <a:ext cx="2844048" cy="369332"/>
+          </a:xfrm>
+          <a:prstGeom prst="rect">
+            <a:avLst/>
+          </a:prstGeom>
+          <a:noFill/>
+        </p:spPr>
+        <p:txBody>
+          <a:bodyPr wrap="none" rtlCol="0">
+            <a:spAutoFit/>
+          </a:bodyPr>
+          <a:lstStyle/>
+          <a:p>
+            <a:r>
+              <a:rPr lang="en-US" b="1" dirty="0">
+                <a:latin typeface="Consolas" panose="020B0609020204030204" pitchFamily="49" charset="0"/>
+                <a:cs typeface="Consolas" panose="020B0609020204030204" pitchFamily="49" charset="0"/>
+              </a:rPr>
+              <a:t>module</a:t>
+            </a:r>
+            <a:r>
+              <a:rPr lang="en-US" dirty="0">
+                <a:latin typeface="Consolas" panose="020B0609020204030204" pitchFamily="49" charset="0"/>
+                <a:cs typeface="Consolas" panose="020B0609020204030204" pitchFamily="49" charset="0"/>
+              </a:rPr>
+              <a:t> </a:t>
+            </a:r>
+            <a:r>
+              <a:rPr lang="en-US" dirty="0" err="1">
+                <a:latin typeface="Consolas" panose="020B0609020204030204" pitchFamily="49" charset="0"/>
+                <a:cs typeface="Consolas" panose="020B0609020204030204" pitchFamily="49" charset="0"/>
+              </a:rPr>
+              <a:t>number_theory</a:t>
+            </a:r>
+            <a:r>
+              <a:rPr lang="en-US" dirty="0">
+                <a:latin typeface="Consolas" panose="020B0609020204030204" pitchFamily="49" charset="0"/>
+                <a:cs typeface="Consolas" panose="020B0609020204030204" pitchFamily="49" charset="0"/>
+              </a:rPr>
+              <a:t>;</a:t>
+            </a:r>
+          </a:p>
+        </p:txBody>
+      </p:sp>
+    </p:spTree>
+    <p:extLst>
+      <p:ext uri="{BB962C8B-B14F-4D97-AF65-F5344CB8AC3E}">
+        <p14:creationId xmlns:p14="http://schemas.microsoft.com/office/powerpoint/2010/main" val="4163914177"/>
+      </p:ext>
+    </p:extLst>
+  </p:cSld>
+  <p:clrMapOvr>
+    <a:masterClrMapping/>
+  </p:clrMapOvr>
+</p:sld>
+</file>
+
+<file path=ppt/slides/slide26.xml><?xml version="1.0" encoding="utf-8"?>
+<p:sld xmlns:a="http://schemas.openxmlformats.org/drawingml/2006/main" xmlns:r="http://schemas.openxmlformats.org/officeDocument/2006/relationships" xmlns:p="http://schemas.openxmlformats.org/presentationml/2006/main">
+  <p:cSld>
+    <p:spTree>
+      <p:nvGrpSpPr>
+        <p:cNvPr id="1" name=""/>
+        <p:cNvGrpSpPr/>
+        <p:nvPr/>
+      </p:nvGrpSpPr>
+      <p:grpSpPr>
+        <a:xfrm>
+          <a:off x="0" y="0"/>
+          <a:ext cx="0" cy="0"/>
+          <a:chOff x="0" y="0"/>
+          <a:chExt cx="0" cy="0"/>
+        </a:xfrm>
+      </p:grpSpPr>
+      <p:sp>
+        <p:nvSpPr>
+          <p:cNvPr id="2" name="Title 1">
+            <a:extLst>
+              <a:ext uri="{FF2B5EF4-FFF2-40B4-BE49-F238E27FC236}">
+                <a16:creationId xmlns:a16="http://schemas.microsoft.com/office/drawing/2014/main" id="{A63636F5-4442-CBF3-5A04-39BA1DE9B18F}"/>
+              </a:ext>
+            </a:extLst>
+          </p:cNvPr>
+          <p:cNvSpPr>
+            <a:spLocks noGrp="1"/>
+          </p:cNvSpPr>
+          <p:nvPr>
+            <p:ph type="title"/>
+          </p:nvPr>
+        </p:nvSpPr>
+        <p:spPr/>
+        <p:txBody>
+          <a:bodyPr/>
+          <a:lstStyle/>
+          <a:p>
+            <a:r>
+              <a:rPr lang="en-US" dirty="0"/>
+              <a:t>What about #include?</a:t>
+            </a:r>
+          </a:p>
+        </p:txBody>
+      </p:sp>
+      <p:sp>
+        <p:nvSpPr>
+          <p:cNvPr id="3" name="Content Placeholder 2">
+            <a:extLst>
+              <a:ext uri="{FF2B5EF4-FFF2-40B4-BE49-F238E27FC236}">
+                <a16:creationId xmlns:a16="http://schemas.microsoft.com/office/drawing/2014/main" id="{209FC024-8FDC-A69B-293C-DBD374707BDF}"/>
+              </a:ext>
+            </a:extLst>
+          </p:cNvPr>
+          <p:cNvSpPr>
+            <a:spLocks noGrp="1"/>
+          </p:cNvSpPr>
+          <p:nvPr>
+            <p:ph idx="1"/>
+          </p:nvPr>
+        </p:nvSpPr>
+        <p:spPr/>
+        <p:txBody>
+          <a:bodyPr/>
+          <a:lstStyle/>
+          <a:p>
+            <a:r>
+              <a:rPr lang="en-US" dirty="0"/>
+              <a:t>There is no #include!</a:t>
+            </a:r>
+          </a:p>
+          <a:p>
+            <a:pPr lvl="1"/>
+            <a:r>
+              <a:rPr lang="en-US" dirty="0"/>
+              <a:t>If you use modules throughout, you never need to #include again!</a:t>
+            </a:r>
+          </a:p>
+          <a:p>
+            <a:r>
+              <a:rPr lang="en-US" dirty="0"/>
+              <a:t>Unfortunately, we must deal with mountains of legacy code</a:t>
+            </a:r>
+          </a:p>
+          <a:p>
+            <a:r>
+              <a:rPr lang="en-US" dirty="0"/>
+              <a:t>The preprocessor is still active so you can still use it in module interface units and module implementation files in the usual way</a:t>
+            </a:r>
+          </a:p>
+          <a:p>
+            <a:pPr lvl="1"/>
+            <a:r>
+              <a:rPr lang="en-US" dirty="0"/>
+              <a:t>It still does what it does, which is not very smart</a:t>
+            </a:r>
+          </a:p>
+          <a:p>
+            <a:pPr lvl="1"/>
+            <a:r>
+              <a:rPr lang="en-US" dirty="0"/>
+              <a:t>Any macros #defined in a module interface unit are not made part of the BMI file, and thus can’t be used by clients of the module. </a:t>
+            </a:r>
+            <a:r>
+              <a:rPr lang="en-US" i="1" dirty="0"/>
+              <a:t>This is one of the main points of modules!</a:t>
+            </a:r>
+          </a:p>
+        </p:txBody>
+      </p:sp>
+    </p:spTree>
+    <p:extLst>
+      <p:ext uri="{BB962C8B-B14F-4D97-AF65-F5344CB8AC3E}">
+        <p14:creationId xmlns:p14="http://schemas.microsoft.com/office/powerpoint/2010/main" val="484066235"/>
+      </p:ext>
+    </p:extLst>
+  </p:cSld>
+  <p:clrMapOvr>
+    <a:masterClrMapping/>
+  </p:clrMapOvr>
+</p:sld>
+</file>
+
+<file path=ppt/slides/slide27.xml><?xml version="1.0" encoding="utf-8"?>
+<p:sld xmlns:a="http://schemas.openxmlformats.org/drawingml/2006/main" xmlns:r="http://schemas.openxmlformats.org/officeDocument/2006/relationships" xmlns:p="http://schemas.openxmlformats.org/presentationml/2006/main">
+  <p:cSld>
+    <p:spTree>
+      <p:nvGrpSpPr>
+        <p:cNvPr id="1" name=""/>
+        <p:cNvGrpSpPr/>
+        <p:nvPr/>
+      </p:nvGrpSpPr>
+      <p:grpSpPr>
+        <a:xfrm>
+          <a:off x="0" y="0"/>
+          <a:ext cx="0" cy="0"/>
+          <a:chOff x="0" y="0"/>
+          <a:chExt cx="0" cy="0"/>
+        </a:xfrm>
+      </p:grpSpPr>
+      <p:sp>
+        <p:nvSpPr>
+          <p:cNvPr id="2" name="Title 1">
+            <a:extLst>
+              <a:ext uri="{FF2B5EF4-FFF2-40B4-BE49-F238E27FC236}">
+                <a16:creationId xmlns:a16="http://schemas.microsoft.com/office/drawing/2014/main" id="{11BFCA5C-C4FC-37FB-6E07-56BD2F8FB2AA}"/>
+              </a:ext>
+            </a:extLst>
+          </p:cNvPr>
+          <p:cNvSpPr>
+            <a:spLocks noGrp="1"/>
+          </p:cNvSpPr>
+          <p:nvPr>
+            <p:ph type="title"/>
+          </p:nvPr>
+        </p:nvSpPr>
+        <p:spPr/>
+        <p:txBody>
+          <a:bodyPr/>
+          <a:lstStyle/>
+          <a:p>
+            <a:r>
+              <a:rPr lang="en-US" dirty="0"/>
+              <a:t>Header Units</a:t>
+            </a:r>
+          </a:p>
+        </p:txBody>
+      </p:sp>
+      <p:sp>
+        <p:nvSpPr>
+          <p:cNvPr id="3" name="Content Placeholder 2">
+            <a:extLst>
+              <a:ext uri="{FF2B5EF4-FFF2-40B4-BE49-F238E27FC236}">
+                <a16:creationId xmlns:a16="http://schemas.microsoft.com/office/drawing/2014/main" id="{A045383E-8439-D492-60C8-D70BE9037F9D}"/>
+              </a:ext>
+            </a:extLst>
+          </p:cNvPr>
+          <p:cNvSpPr>
+            <a:spLocks noGrp="1"/>
+          </p:cNvSpPr>
+          <p:nvPr>
+            <p:ph idx="1"/>
+          </p:nvPr>
+        </p:nvSpPr>
+        <p:spPr/>
+        <p:txBody>
+          <a:bodyPr/>
+          <a:lstStyle/>
+          <a:p>
+            <a:r>
+              <a:rPr lang="en-US" dirty="0"/>
+              <a:t>If you #include a header in a module interface unit, it is likely that none of the declarations in that header are preceded by </a:t>
+            </a:r>
+            <a:r>
+              <a:rPr lang="en-US" b="1" dirty="0">
+                <a:latin typeface="Consolas" panose="020B0609020204030204" pitchFamily="49" charset="0"/>
+                <a:cs typeface="Consolas" panose="020B0609020204030204" pitchFamily="49" charset="0"/>
+              </a:rPr>
+              <a:t>export</a:t>
+            </a:r>
+          </a:p>
+          <a:p>
+            <a:pPr lvl="1"/>
+            <a:r>
+              <a:rPr lang="en-US" dirty="0"/>
+              <a:t>Thus, those declarations are invisible to clients of the module, which is probably good (no spurious includes)</a:t>
+            </a:r>
+          </a:p>
+          <a:p>
+            <a:pPr lvl="1"/>
+            <a:r>
+              <a:rPr lang="en-US" dirty="0"/>
+              <a:t>However, the compiler will assume all those declarations are internal to the module, which is probably bad</a:t>
+            </a:r>
+          </a:p>
+          <a:p>
+            <a:r>
+              <a:rPr lang="en-US" dirty="0"/>
+              <a:t>C++ 2020 allows you to compile traditional header files into </a:t>
+            </a:r>
+            <a:r>
+              <a:rPr lang="en-US" i="1" dirty="0"/>
+              <a:t>header units</a:t>
+            </a:r>
+          </a:p>
+          <a:p>
+            <a:pPr lvl="1"/>
+            <a:r>
+              <a:rPr lang="en-US" dirty="0"/>
+              <a:t>The compiler creates a BMI file for the header as if all the (non-macro) declarations in the header were exported (even if not explicitly marked at such)</a:t>
+            </a:r>
+          </a:p>
+        </p:txBody>
+      </p:sp>
+    </p:spTree>
+    <p:extLst>
+      <p:ext uri="{BB962C8B-B14F-4D97-AF65-F5344CB8AC3E}">
+        <p14:creationId xmlns:p14="http://schemas.microsoft.com/office/powerpoint/2010/main" val="4286055154"/>
+      </p:ext>
+    </p:extLst>
+  </p:cSld>
+  <p:clrMapOvr>
+    <a:masterClrMapping/>
+  </p:clrMapOvr>
+</p:sld>
+</file>
+
+<file path=ppt/slides/slide28.xml><?xml version="1.0" encoding="utf-8"?>
+<p:sld xmlns:a="http://schemas.openxmlformats.org/drawingml/2006/main" xmlns:r="http://schemas.openxmlformats.org/officeDocument/2006/relationships" xmlns:p="http://schemas.openxmlformats.org/presentationml/2006/main">
+  <p:cSld>
+    <p:spTree>
+      <p:nvGrpSpPr>
+        <p:cNvPr id="1" name=""/>
+        <p:cNvGrpSpPr/>
+        <p:nvPr/>
+      </p:nvGrpSpPr>
+      <p:grpSpPr>
+        <a:xfrm>
+          <a:off x="0" y="0"/>
+          <a:ext cx="0" cy="0"/>
+          <a:chOff x="0" y="0"/>
+          <a:chExt cx="0" cy="0"/>
+        </a:xfrm>
+      </p:grpSpPr>
+      <p:sp>
+        <p:nvSpPr>
+          <p:cNvPr id="2" name="Title 1">
+            <a:extLst>
+              <a:ext uri="{FF2B5EF4-FFF2-40B4-BE49-F238E27FC236}">
+                <a16:creationId xmlns:a16="http://schemas.microsoft.com/office/drawing/2014/main" id="{8D0773A4-6812-49B9-D092-B1A5AF0F6ED5}"/>
+              </a:ext>
+            </a:extLst>
+          </p:cNvPr>
+          <p:cNvSpPr>
+            <a:spLocks noGrp="1"/>
+          </p:cNvSpPr>
+          <p:nvPr>
+            <p:ph type="title"/>
+          </p:nvPr>
+        </p:nvSpPr>
+        <p:spPr/>
+        <p:txBody>
+          <a:bodyPr/>
+          <a:lstStyle/>
+          <a:p>
+            <a:r>
+              <a:rPr lang="en-US" dirty="0"/>
+              <a:t>Importing Header Units</a:t>
+            </a:r>
+          </a:p>
+        </p:txBody>
+      </p:sp>
+      <p:sp>
+        <p:nvSpPr>
+          <p:cNvPr id="3" name="Content Placeholder 2">
+            <a:extLst>
+              <a:ext uri="{FF2B5EF4-FFF2-40B4-BE49-F238E27FC236}">
+                <a16:creationId xmlns:a16="http://schemas.microsoft.com/office/drawing/2014/main" id="{4030D93C-4FEA-073E-A40C-7156101B5E0B}"/>
+              </a:ext>
+            </a:extLst>
+          </p:cNvPr>
+          <p:cNvSpPr>
+            <a:spLocks noGrp="1"/>
+          </p:cNvSpPr>
+          <p:nvPr>
+            <p:ph idx="1"/>
+          </p:nvPr>
+        </p:nvSpPr>
+        <p:spPr/>
+        <p:txBody>
+          <a:bodyPr/>
+          <a:lstStyle/>
+          <a:p>
+            <a:r>
+              <a:rPr lang="en-US" dirty="0"/>
+              <a:t>To use a previously compiled header unit, do:</a:t>
+            </a:r>
+            <a:br>
+              <a:rPr lang="en-US" dirty="0"/>
+            </a:br>
+            <a:br>
+              <a:rPr lang="en-US" dirty="0"/>
+            </a:br>
+            <a:endParaRPr lang="en-US" dirty="0"/>
+          </a:p>
+          <a:p>
+            <a:r>
+              <a:rPr lang="en-US" dirty="0"/>
+              <a:t>The compiler looks for the BMI file </a:t>
+            </a:r>
+            <a:r>
+              <a:rPr lang="en-US" i="1" dirty="0"/>
+              <a:t>you</a:t>
+            </a:r>
+            <a:r>
+              <a:rPr lang="en-US" dirty="0"/>
+              <a:t> compiled from the original header</a:t>
+            </a:r>
+          </a:p>
+          <a:p>
+            <a:r>
+              <a:rPr lang="en-US" dirty="0"/>
+              <a:t>This is useful for libraries that are not yet modularized (i.e., pretty much all existing libraries)</a:t>
+            </a:r>
+          </a:p>
+          <a:p>
+            <a:r>
+              <a:rPr lang="en-US" dirty="0"/>
+              <a:t>This creates fewer problems than trying to #include the headers themselves</a:t>
+            </a:r>
+          </a:p>
+        </p:txBody>
+      </p:sp>
+      <p:sp>
+        <p:nvSpPr>
+          <p:cNvPr id="4" name="TextBox 3">
+            <a:extLst>
+              <a:ext uri="{FF2B5EF4-FFF2-40B4-BE49-F238E27FC236}">
+                <a16:creationId xmlns:a16="http://schemas.microsoft.com/office/drawing/2014/main" id="{A970BC67-B229-560E-83D1-8468AFEDB247}"/>
+              </a:ext>
+            </a:extLst>
+          </p:cNvPr>
+          <p:cNvSpPr txBox="1"/>
+          <p:nvPr/>
+        </p:nvSpPr>
+        <p:spPr>
+          <a:xfrm>
+            <a:off x="1088572" y="2503713"/>
+            <a:ext cx="3097323" cy="369332"/>
+          </a:xfrm>
+          <a:prstGeom prst="rect">
+            <a:avLst/>
+          </a:prstGeom>
+          <a:noFill/>
+        </p:spPr>
+        <p:txBody>
+          <a:bodyPr wrap="none" rtlCol="0">
+            <a:spAutoFit/>
+          </a:bodyPr>
+          <a:lstStyle/>
+          <a:p>
+            <a:r>
+              <a:rPr lang="en-US" b="1" dirty="0">
+                <a:latin typeface="Consolas" panose="020B0609020204030204" pitchFamily="49" charset="0"/>
+                <a:cs typeface="Consolas" panose="020B0609020204030204" pitchFamily="49" charset="0"/>
+              </a:rPr>
+              <a:t>import</a:t>
+            </a:r>
+            <a:r>
+              <a:rPr lang="en-US" dirty="0">
+                <a:latin typeface="Consolas" panose="020B0609020204030204" pitchFamily="49" charset="0"/>
+                <a:cs typeface="Consolas" panose="020B0609020204030204" pitchFamily="49" charset="0"/>
+              </a:rPr>
+              <a:t> &lt;</a:t>
+            </a:r>
+            <a:r>
+              <a:rPr lang="en-US" dirty="0" err="1">
+                <a:latin typeface="Consolas" panose="020B0609020204030204" pitchFamily="49" charset="0"/>
+                <a:cs typeface="Consolas" panose="020B0609020204030204" pitchFamily="49" charset="0"/>
+              </a:rPr>
+              <a:t>legacy_header</a:t>
+            </a:r>
+            <a:r>
+              <a:rPr lang="en-US" dirty="0">
+                <a:latin typeface="Consolas" panose="020B0609020204030204" pitchFamily="49" charset="0"/>
+                <a:cs typeface="Consolas" panose="020B0609020204030204" pitchFamily="49" charset="0"/>
+              </a:rPr>
+              <a:t>&gt;;</a:t>
+            </a:r>
+          </a:p>
+        </p:txBody>
+      </p:sp>
+    </p:spTree>
+    <p:extLst>
+      <p:ext uri="{BB962C8B-B14F-4D97-AF65-F5344CB8AC3E}">
+        <p14:creationId xmlns:p14="http://schemas.microsoft.com/office/powerpoint/2010/main" val="2191432804"/>
+      </p:ext>
+    </p:extLst>
+  </p:cSld>
+  <p:clrMapOvr>
+    <a:masterClrMapping/>
+  </p:clrMapOvr>
+</p:sld>
+</file>
+
+<file path=ppt/slides/slide29.xml><?xml version="1.0" encoding="utf-8"?>
+<p:sld xmlns:a="http://schemas.openxmlformats.org/drawingml/2006/main" xmlns:r="http://schemas.openxmlformats.org/officeDocument/2006/relationships" xmlns:p="http://schemas.openxmlformats.org/presentationml/2006/main">
+  <p:cSld>
+    <p:spTree>
+      <p:nvGrpSpPr>
+        <p:cNvPr id="1" name=""/>
+        <p:cNvGrpSpPr/>
+        <p:nvPr/>
+      </p:nvGrpSpPr>
+      <p:grpSpPr>
+        <a:xfrm>
+          <a:off x="0" y="0"/>
+          <a:ext cx="0" cy="0"/>
+          <a:chOff x="0" y="0"/>
+          <a:chExt cx="0" cy="0"/>
+        </a:xfrm>
+      </p:grpSpPr>
+      <p:sp>
+        <p:nvSpPr>
+          <p:cNvPr id="2" name="Title 1">
+            <a:extLst>
+              <a:ext uri="{FF2B5EF4-FFF2-40B4-BE49-F238E27FC236}">
+                <a16:creationId xmlns:a16="http://schemas.microsoft.com/office/drawing/2014/main" id="{734D0745-8F4F-7EC1-5915-DD108AA13C92}"/>
+              </a:ext>
+            </a:extLst>
+          </p:cNvPr>
+          <p:cNvSpPr>
+            <a:spLocks noGrp="1"/>
+          </p:cNvSpPr>
+          <p:nvPr>
+            <p:ph type="title"/>
+          </p:nvPr>
+        </p:nvSpPr>
+        <p:spPr/>
+        <p:txBody>
+          <a:bodyPr/>
+          <a:lstStyle/>
+          <a:p>
+            <a:r>
+              <a:rPr lang="en-US" dirty="0"/>
+              <a:t>C++ 2020</a:t>
+            </a:r>
+          </a:p>
+        </p:txBody>
+      </p:sp>
+      <p:sp>
+        <p:nvSpPr>
+          <p:cNvPr id="3" name="Content Placeholder 2">
+            <a:extLst>
+              <a:ext uri="{FF2B5EF4-FFF2-40B4-BE49-F238E27FC236}">
+                <a16:creationId xmlns:a16="http://schemas.microsoft.com/office/drawing/2014/main" id="{2F87C9CE-090A-D874-8D55-9E1D42F47F74}"/>
+              </a:ext>
+            </a:extLst>
+          </p:cNvPr>
+          <p:cNvSpPr>
+            <a:spLocks noGrp="1"/>
+          </p:cNvSpPr>
+          <p:nvPr>
+            <p:ph idx="1"/>
+          </p:nvPr>
+        </p:nvSpPr>
+        <p:spPr/>
+        <p:txBody>
+          <a:bodyPr>
+            <a:normAutofit/>
+          </a:bodyPr>
+          <a:lstStyle/>
+          <a:p>
+            <a:r>
+              <a:rPr lang="en-US" dirty="0"/>
+              <a:t>Unfortunately, C++ 2020 does not provide a modularized library and does not come with pre-compiled header units for the standard library</a:t>
+            </a:r>
+          </a:p>
+          <a:p>
+            <a:pPr lvl="1"/>
+            <a:r>
+              <a:rPr lang="en-US" dirty="0"/>
+              <a:t>You must compile the header units yourself for all standard library headers you want to use. This is a major pain</a:t>
+            </a:r>
+          </a:p>
+          <a:p>
+            <a:r>
+              <a:rPr lang="en-US" dirty="0"/>
+              <a:t>Solution: </a:t>
+            </a:r>
+            <a:r>
+              <a:rPr lang="en-US" i="1" dirty="0"/>
+              <a:t>Move to C++ 2023 at your first opportunity</a:t>
+            </a:r>
+            <a:r>
+              <a:rPr lang="en-US" dirty="0"/>
+              <a:t> so you can import module </a:t>
+            </a:r>
+            <a:r>
+              <a:rPr lang="en-US" dirty="0">
+                <a:latin typeface="Consolas" panose="020B0609020204030204" pitchFamily="49" charset="0"/>
+                <a:cs typeface="Consolas" panose="020B0609020204030204" pitchFamily="49" charset="0"/>
+              </a:rPr>
+              <a:t>std</a:t>
+            </a:r>
+            <a:r>
+              <a:rPr lang="en-US" dirty="0"/>
+              <a:t> directly. Use header units only for third party library or legacy code</a:t>
+            </a:r>
+          </a:p>
+          <a:p>
+            <a:r>
+              <a:rPr lang="en-US" dirty="0"/>
+              <a:t>The “big three” compilers all agree to support importing module </a:t>
+            </a:r>
+            <a:r>
+              <a:rPr lang="en-US" dirty="0">
+                <a:latin typeface="Consolas" panose="020B0609020204030204" pitchFamily="49" charset="0"/>
+                <a:cs typeface="Consolas" panose="020B0609020204030204" pitchFamily="49" charset="0"/>
+              </a:rPr>
+              <a:t>std</a:t>
+            </a:r>
+            <a:r>
+              <a:rPr lang="en-US" dirty="0"/>
+              <a:t> in C++ 2020 mode also, but that’s not widely available yet</a:t>
+            </a:r>
+          </a:p>
+        </p:txBody>
+      </p:sp>
+    </p:spTree>
+    <p:extLst>
+      <p:ext uri="{BB962C8B-B14F-4D97-AF65-F5344CB8AC3E}">
+        <p14:creationId xmlns:p14="http://schemas.microsoft.com/office/powerpoint/2010/main" val="2574348228"/>
       </p:ext>
     </p:extLst>
   </p:cSld>
@@ -5767,7 +7721,21 @@
                 <a:latin typeface="Courier New" panose="02070309020205020404" pitchFamily="49" charset="0"/>
                 <a:cs typeface="Courier New" panose="02070309020205020404" pitchFamily="49" charset="0"/>
               </a:rPr>
-              <a:t> x; // Declares that the int x exists.</a:t>
+              <a:t> x; // </a:t>
+            </a:r>
+            <a:r>
+              <a:rPr lang="en-US" u="sng" dirty="0">
+                <a:latin typeface="Courier New" panose="02070309020205020404" pitchFamily="49" charset="0"/>
+                <a:cs typeface="Courier New" panose="02070309020205020404" pitchFamily="49" charset="0"/>
+              </a:rPr>
+              <a:t>Declares</a:t>
+            </a:r>
+            <a:r>
+              <a:rPr lang="en-US" dirty="0">
+                <a:latin typeface="Courier New" panose="02070309020205020404" pitchFamily="49" charset="0"/>
+                <a:cs typeface="Courier New" panose="02070309020205020404" pitchFamily="49" charset="0"/>
+              </a:rPr>
+              <a:t> that the int x exists.</a:t>
             </a:r>
           </a:p>
           <a:p>
@@ -5784,20 +7752,34 @@
                 <a:latin typeface="Courier New" panose="02070309020205020404" pitchFamily="49" charset="0"/>
                 <a:cs typeface="Courier New" panose="02070309020205020404" pitchFamily="49" charset="0"/>
               </a:rPr>
-              <a:t> x = 0;    // Defines the integer.</a:t>
-            </a:r>
-          </a:p>
-          <a:p>
-            <a:pPr lvl="1"/>
-            <a:r>
-              <a:rPr lang="en-US" dirty="0"/>
-              <a:t>Global objects have default initial values. The </a:t>
+              <a:t> x = 0;    // </a:t>
+            </a:r>
+            <a:r>
+              <a:rPr lang="en-US" u="sng" dirty="0">
+                <a:latin typeface="Courier New" panose="02070309020205020404" pitchFamily="49" charset="0"/>
+                <a:cs typeface="Courier New" panose="02070309020205020404" pitchFamily="49" charset="0"/>
+              </a:rPr>
+              <a:t>Defines</a:t>
             </a:r>
             <a:r>
               <a:rPr lang="en-US" dirty="0">
                 <a:latin typeface="Courier New" panose="02070309020205020404" pitchFamily="49" charset="0"/>
                 <a:cs typeface="Courier New" panose="02070309020205020404" pitchFamily="49" charset="0"/>
               </a:rPr>
+              <a:t> the integer.</a:t>
+            </a:r>
+          </a:p>
+          <a:p>
+            <a:pPr lvl="1"/>
+            <a:r>
+              <a:rPr lang="en-US" dirty="0"/>
+              <a:t>Global objects have default initial values. The </a:t>
+            </a:r>
+            <a:r>
+              <a:rPr lang="en-US" dirty="0">
+                <a:latin typeface="Courier New" panose="02070309020205020404" pitchFamily="49" charset="0"/>
+                <a:cs typeface="Courier New" panose="02070309020205020404" pitchFamily="49" charset="0"/>
+              </a:rPr>
               <a:t>extern</a:t>
             </a:r>
             <a:r>
@@ -5853,7 +7835,21 @@
                 <a:latin typeface="Courier New" panose="02070309020205020404" pitchFamily="49" charset="0"/>
                 <a:cs typeface="Courier New" panose="02070309020205020404" pitchFamily="49" charset="0"/>
               </a:rPr>
-              <a:t> x );  // A declaration*.</a:t>
+              <a:t> x );  // A </a:t>
+            </a:r>
+            <a:r>
+              <a:rPr lang="en-US" u="sng" dirty="0">
+                <a:latin typeface="Courier New" panose="02070309020205020404" pitchFamily="49" charset="0"/>
+                <a:cs typeface="Courier New" panose="02070309020205020404" pitchFamily="49" charset="0"/>
+              </a:rPr>
+              <a:t>declaration</a:t>
+            </a:r>
+            <a:r>
+              <a:rPr lang="en-US" dirty="0">
+                <a:latin typeface="Courier New" panose="02070309020205020404" pitchFamily="49" charset="0"/>
+                <a:cs typeface="Courier New" panose="02070309020205020404" pitchFamily="49" charset="0"/>
+              </a:rPr>
+              <a:t>*.</a:t>
             </a:r>
           </a:p>
           <a:p>
@@ -5924,7 +7920,21 @@
                 <a:latin typeface="Courier New" panose="02070309020205020404" pitchFamily="49" charset="0"/>
                 <a:cs typeface="Courier New" panose="02070309020205020404" pitchFamily="49" charset="0"/>
               </a:rPr>
-              <a:t>}   // Defines the function by providing its body.</a:t>
+              <a:t>}   // </a:t>
+            </a:r>
+            <a:r>
+              <a:rPr lang="en-US" u="sng" dirty="0">
+                <a:latin typeface="Courier New" panose="02070309020205020404" pitchFamily="49" charset="0"/>
+                <a:cs typeface="Courier New" panose="02070309020205020404" pitchFamily="49" charset="0"/>
+              </a:rPr>
+              <a:t>Defines</a:t>
+            </a:r>
+            <a:r>
+              <a:rPr lang="en-US" dirty="0">
+                <a:latin typeface="Courier New" panose="02070309020205020404" pitchFamily="49" charset="0"/>
+                <a:cs typeface="Courier New" panose="02070309020205020404" pitchFamily="49" charset="0"/>
+              </a:rPr>
+              <a:t> the function by providing its body.</a:t>
             </a:r>
           </a:p>
         </p:txBody>
@@ -5962,7 +7972,7 @@
               <a:t>* For functions the </a:t>
             </a:r>
             <a:r>
-              <a:rPr lang="en-US" dirty="0">
+              <a:rPr lang="en-US" b="1" dirty="0">
                 <a:latin typeface="Courier New" panose="02070309020205020404" pitchFamily="49" charset="0"/>
                 <a:cs typeface="Courier New" panose="02070309020205020404" pitchFamily="49" charset="0"/>
               </a:rPr>
@@ -6069,7 +8079,15 @@
           <a:p>
             <a:r>
               <a:rPr lang="en-US" dirty="0"/>
-              <a:t>However, when compiling a translation unit (TU), the compiler does not need to know where declared entities are defined…</a:t>
+              <a:t>However, when compiling a </a:t>
+            </a:r>
+            <a:r>
+              <a:rPr lang="en-US" i="1" dirty="0"/>
+              <a:t>translation unit</a:t>
+            </a:r>
+            <a:r>
+              <a:rPr lang="en-US" dirty="0"/>
+              <a:t> (TU), the compiler does not need to know where declared entities are defined…</a:t>
             </a:r>
           </a:p>
           <a:p>
@@ -6082,7 +8100,7 @@
           <a:p>
             <a:r>
               <a:rPr lang="en-US" dirty="0"/>
-              <a:t>The linker “resolves the external references” by connecting usages of declared entities with their definitions.</a:t>
+              <a:t>The linker “resolves external references” by connecting usages of declared entities with their definitions.</a:t>
             </a:r>
           </a:p>
           <a:p>
@@ -6652,7 +8670,7 @@
         <p:spPr>
           <a:xfrm>
             <a:off x="7120462" y="1990770"/>
-            <a:ext cx="4313938" cy="369332"/>
+            <a:ext cx="3946850" cy="369332"/>
           </a:xfrm>
           <a:prstGeom prst="rect">
             <a:avLst/>
@@ -6667,7 +8685,7 @@
           <a:p>
             <a:r>
               <a:rPr lang="en-US" dirty="0"/>
-              <a:t>… contains the </a:t>
+              <a:t>… contains </a:t>
             </a:r>
             <a:r>
               <a:rPr lang="en-US" i="1" dirty="0"/>
@@ -6946,7 +8964,15 @@
             </a:r>
             <a:r>
               <a:rPr lang="en-US" i="1" dirty="0"/>
-              <a:t>Every entity must have only one definition in the entire program</a:t>
+              <a:t>Every entity must have only one </a:t>
+            </a:r>
+            <a:r>
+              <a:rPr lang="en-US" b="1" i="1" dirty="0"/>
+              <a:t>definition</a:t>
+            </a:r>
+            <a:r>
+              <a:rPr lang="en-US" i="1" dirty="0"/>
+              <a:t> in the entire program</a:t>
             </a:r>
             <a:r>
               <a:rPr lang="en-US" dirty="0"/>
@@ -7071,7 +9097,7 @@
             </a:r>
             <a:r>
               <a:rPr lang="en-US" dirty="0"/>
-              <a:t> in that TU</a:t>
+              <a:t> (or defined) in that TU</a:t>
             </a:r>
           </a:p>
           <a:p>
@@ -7274,7 +9300,7 @@
           <a:p>
             <a:r>
               <a:rPr lang="en-US" dirty="0"/>
-              <a:t>Function templates need to be </a:t>
+              <a:t>Templates need to be </a:t>
             </a:r>
             <a:r>
               <a:rPr lang="en-US" u="sng" dirty="0"/>

</xml_diff>